<commit_message>
Updated image with more arrows
</commit_message>
<xml_diff>
--- a/image/CS3103.pptx
+++ b/image/CS3103.pptx
@@ -106,6 +106,11 @@
       </a:defRPr>
     </a:lvl9pPr>
   </p:defaultTextStyle>
+  <p:extLst>
+    <p:ext uri="{EFAFB233-063F-42B5-8137-9DF3F51BA10A}">
+      <p15:sldGuideLst xmlns:p15="http://schemas.microsoft.com/office/powerpoint/2012/main"/>
+    </p:ext>
+  </p:extLst>
 </p:presentation>
 </file>
 
@@ -258,7 +263,7 @@
           <a:p>
             <a:fld id="{CBC8E649-B73B-4477-B0E0-354D57AB8D4C}" type="datetimeFigureOut">
               <a:rPr lang="en-SG" smtClean="0"/>
-              <a:t>16/10/2018</a:t>
+              <a:t>17/10/2018</a:t>
             </a:fld>
             <a:endParaRPr lang="en-SG"/>
           </a:p>
@@ -458,7 +463,7 @@
           <a:p>
             <a:fld id="{CBC8E649-B73B-4477-B0E0-354D57AB8D4C}" type="datetimeFigureOut">
               <a:rPr lang="en-SG" smtClean="0"/>
-              <a:t>16/10/2018</a:t>
+              <a:t>17/10/2018</a:t>
             </a:fld>
             <a:endParaRPr lang="en-SG"/>
           </a:p>
@@ -668,7 +673,7 @@
           <a:p>
             <a:fld id="{CBC8E649-B73B-4477-B0E0-354D57AB8D4C}" type="datetimeFigureOut">
               <a:rPr lang="en-SG" smtClean="0"/>
-              <a:t>16/10/2018</a:t>
+              <a:t>17/10/2018</a:t>
             </a:fld>
             <a:endParaRPr lang="en-SG"/>
           </a:p>
@@ -868,7 +873,7 @@
           <a:p>
             <a:fld id="{CBC8E649-B73B-4477-B0E0-354D57AB8D4C}" type="datetimeFigureOut">
               <a:rPr lang="en-SG" smtClean="0"/>
-              <a:t>16/10/2018</a:t>
+              <a:t>17/10/2018</a:t>
             </a:fld>
             <a:endParaRPr lang="en-SG"/>
           </a:p>
@@ -1144,7 +1149,7 @@
           <a:p>
             <a:fld id="{CBC8E649-B73B-4477-B0E0-354D57AB8D4C}" type="datetimeFigureOut">
               <a:rPr lang="en-SG" smtClean="0"/>
-              <a:t>16/10/2018</a:t>
+              <a:t>17/10/2018</a:t>
             </a:fld>
             <a:endParaRPr lang="en-SG"/>
           </a:p>
@@ -1412,7 +1417,7 @@
           <a:p>
             <a:fld id="{CBC8E649-B73B-4477-B0E0-354D57AB8D4C}" type="datetimeFigureOut">
               <a:rPr lang="en-SG" smtClean="0"/>
-              <a:t>16/10/2018</a:t>
+              <a:t>17/10/2018</a:t>
             </a:fld>
             <a:endParaRPr lang="en-SG"/>
           </a:p>
@@ -1827,7 +1832,7 @@
           <a:p>
             <a:fld id="{CBC8E649-B73B-4477-B0E0-354D57AB8D4C}" type="datetimeFigureOut">
               <a:rPr lang="en-SG" smtClean="0"/>
-              <a:t>16/10/2018</a:t>
+              <a:t>17/10/2018</a:t>
             </a:fld>
             <a:endParaRPr lang="en-SG"/>
           </a:p>
@@ -1969,7 +1974,7 @@
           <a:p>
             <a:fld id="{CBC8E649-B73B-4477-B0E0-354D57AB8D4C}" type="datetimeFigureOut">
               <a:rPr lang="en-SG" smtClean="0"/>
-              <a:t>16/10/2018</a:t>
+              <a:t>17/10/2018</a:t>
             </a:fld>
             <a:endParaRPr lang="en-SG"/>
           </a:p>
@@ -2082,7 +2087,7 @@
           <a:p>
             <a:fld id="{CBC8E649-B73B-4477-B0E0-354D57AB8D4C}" type="datetimeFigureOut">
               <a:rPr lang="en-SG" smtClean="0"/>
-              <a:t>16/10/2018</a:t>
+              <a:t>17/10/2018</a:t>
             </a:fld>
             <a:endParaRPr lang="en-SG"/>
           </a:p>
@@ -2395,7 +2400,7 @@
           <a:p>
             <a:fld id="{CBC8E649-B73B-4477-B0E0-354D57AB8D4C}" type="datetimeFigureOut">
               <a:rPr lang="en-SG" smtClean="0"/>
-              <a:t>16/10/2018</a:t>
+              <a:t>17/10/2018</a:t>
             </a:fld>
             <a:endParaRPr lang="en-SG"/>
           </a:p>
@@ -2684,7 +2689,7 @@
           <a:p>
             <a:fld id="{CBC8E649-B73B-4477-B0E0-354D57AB8D4C}" type="datetimeFigureOut">
               <a:rPr lang="en-SG" smtClean="0"/>
-              <a:t>16/10/2018</a:t>
+              <a:t>17/10/2018</a:t>
             </a:fld>
             <a:endParaRPr lang="en-SG"/>
           </a:p>
@@ -2927,7 +2932,7 @@
           <a:p>
             <a:fld id="{CBC8E649-B73B-4477-B0E0-354D57AB8D4C}" type="datetimeFigureOut">
               <a:rPr lang="en-SG" smtClean="0"/>
-              <a:t>16/10/2018</a:t>
+              <a:t>17/10/2018</a:t>
             </a:fld>
             <a:endParaRPr lang="en-SG"/>
           </a:p>
@@ -6925,7 +6930,7 @@
                   <a:schemeClr val="tx1"/>
                 </a:solidFill>
               </a:rPr>
-              <a:t>6881</a:t>
+              <a:t>Random</a:t>
             </a:r>
           </a:p>
         </p:txBody>
@@ -6974,7 +6979,7 @@
           <a:p>
             <a:pPr algn="ctr"/>
             <a:r>
-              <a:rPr lang="en-SG" sz="1200" dirty="0">
+              <a:rPr lang="en-SG" sz="1200">
                 <a:solidFill>
                   <a:schemeClr val="tx1"/>
                 </a:solidFill>
@@ -6985,13 +6990,18 @@
           <a:p>
             <a:pPr algn="ctr"/>
             <a:r>
-              <a:rPr lang="en-SG" sz="1200" dirty="0">
+              <a:rPr lang="en-SG" sz="1200">
                 <a:solidFill>
                   <a:schemeClr val="tx1"/>
                 </a:solidFill>
               </a:rPr>
-              <a:t>Random</a:t>
-            </a:r>
+              <a:t>6881</a:t>
+            </a:r>
+            <a:endParaRPr lang="en-SG" sz="1200" dirty="0">
+              <a:solidFill>
+                <a:schemeClr val="tx1"/>
+              </a:solidFill>
+            </a:endParaRPr>
           </a:p>
         </p:txBody>
       </p:sp>
@@ -7044,7 +7054,7 @@
                   <a:schemeClr val="tx1"/>
                 </a:solidFill>
               </a:rPr>
-              <a:t>Incoming</a:t>
+              <a:t>Outgoing</a:t>
             </a:r>
           </a:p>
         </p:txBody>
@@ -7098,7 +7108,7 @@
                   <a:schemeClr val="tx1"/>
                 </a:solidFill>
               </a:rPr>
-              <a:t>Outgoing</a:t>
+              <a:t>Incoming</a:t>
             </a:r>
           </a:p>
         </p:txBody>
@@ -7334,7 +7344,7 @@
         </p:nvSpPr>
         <p:spPr>
           <a:xfrm>
-            <a:off x="4200803" y="800888"/>
+            <a:off x="5245899" y="1282025"/>
             <a:ext cx="1288045" cy="276999"/>
           </a:xfrm>
           <a:prstGeom prst="rect">
@@ -7412,7 +7422,7 @@
         </p:nvSpPr>
         <p:spPr>
           <a:xfrm>
-            <a:off x="8464319" y="1660124"/>
+            <a:off x="6974567" y="800282"/>
             <a:ext cx="2615272" cy="276999"/>
           </a:xfrm>
           <a:prstGeom prst="rect">
@@ -7435,10 +7445,10 @@
       </p:sp>
       <p:sp>
         <p:nvSpPr>
-          <p:cNvPr id="82" name="TextBox 81">
-            <a:extLst>
-              <a:ext uri="{FF2B5EF4-FFF2-40B4-BE49-F238E27FC236}">
-                <a16:creationId xmlns:a16="http://schemas.microsoft.com/office/drawing/2014/main" id="{33EDACA8-49B9-4354-9227-DE56ACAB25CA}"/>
+          <p:cNvPr id="86" name="TextBox 85">
+            <a:extLst>
+              <a:ext uri="{FF2B5EF4-FFF2-40B4-BE49-F238E27FC236}">
+                <a16:creationId xmlns:a16="http://schemas.microsoft.com/office/drawing/2014/main" id="{C95ADF47-4D63-47C6-BCC9-FB3259C1DD61}"/>
               </a:ext>
             </a:extLst>
           </p:cNvPr>
@@ -7447,8 +7457,8 @@
         </p:nvSpPr>
         <p:spPr>
           <a:xfrm>
-            <a:off x="6300477" y="1044802"/>
-            <a:ext cx="1288045" cy="276999"/>
+            <a:off x="4887585" y="2894481"/>
+            <a:ext cx="1101968" cy="276999"/>
           </a:xfrm>
           <a:prstGeom prst="rect">
             <a:avLst/>
@@ -7463,40 +7473,140 @@
           <a:p>
             <a:r>
               <a:rPr lang="en-SG" sz="1200" dirty="0"/>
-              <a:t>Reply filename/IP</a:t>
+              <a:t>Request chunk</a:t>
+            </a:r>
+          </a:p>
+        </p:txBody>
+      </p:sp>
+      <p:sp>
+        <p:nvSpPr>
+          <p:cNvPr id="90" name="TextBox 89">
+            <a:extLst>
+              <a:ext uri="{FF2B5EF4-FFF2-40B4-BE49-F238E27FC236}">
+                <a16:creationId xmlns:a16="http://schemas.microsoft.com/office/drawing/2014/main" id="{20247B9A-7842-4FE9-805F-0C7212068BA7}"/>
+              </a:ext>
+            </a:extLst>
+          </p:cNvPr>
+          <p:cNvSpPr txBox="1"/>
+          <p:nvPr/>
+        </p:nvSpPr>
+        <p:spPr>
+          <a:xfrm>
+            <a:off x="6988368" y="3664638"/>
+            <a:ext cx="1101968" cy="276999"/>
+          </a:xfrm>
+          <a:prstGeom prst="rect">
+            <a:avLst/>
+          </a:prstGeom>
+          <a:noFill/>
+        </p:spPr>
+        <p:txBody>
+          <a:bodyPr wrap="none" rtlCol="0">
+            <a:spAutoFit/>
+          </a:bodyPr>
+          <a:lstStyle/>
+          <a:p>
+            <a:r>
+              <a:rPr lang="en-SG" sz="1200" dirty="0"/>
+              <a:t>Request chunk</a:t>
+            </a:r>
+          </a:p>
+        </p:txBody>
+      </p:sp>
+      <p:sp>
+        <p:nvSpPr>
+          <p:cNvPr id="99" name="TextBox 98">
+            <a:extLst>
+              <a:ext uri="{FF2B5EF4-FFF2-40B4-BE49-F238E27FC236}">
+                <a16:creationId xmlns:a16="http://schemas.microsoft.com/office/drawing/2014/main" id="{33123D3C-5641-4EBD-BCBA-7F47E0D4E856}"/>
+              </a:ext>
+            </a:extLst>
+          </p:cNvPr>
+          <p:cNvSpPr txBox="1"/>
+          <p:nvPr/>
+        </p:nvSpPr>
+        <p:spPr>
+          <a:xfrm>
+            <a:off x="6671090" y="3218927"/>
+            <a:ext cx="904415" cy="276999"/>
+          </a:xfrm>
+          <a:prstGeom prst="rect">
+            <a:avLst/>
+          </a:prstGeom>
+          <a:noFill/>
+        </p:spPr>
+        <p:txBody>
+          <a:bodyPr wrap="none" rtlCol="0">
+            <a:spAutoFit/>
+          </a:bodyPr>
+          <a:lstStyle/>
+          <a:p>
+            <a:r>
+              <a:rPr lang="en-SG" sz="1200" dirty="0"/>
+              <a:t>Send chunk</a:t>
+            </a:r>
+          </a:p>
+        </p:txBody>
+      </p:sp>
+      <p:sp>
+        <p:nvSpPr>
+          <p:cNvPr id="100" name="TextBox 99">
+            <a:extLst>
+              <a:ext uri="{FF2B5EF4-FFF2-40B4-BE49-F238E27FC236}">
+                <a16:creationId xmlns:a16="http://schemas.microsoft.com/office/drawing/2014/main" id="{D99B952C-E7C2-4B7D-B4AB-78FD40FA3F18}"/>
+              </a:ext>
+            </a:extLst>
+          </p:cNvPr>
+          <p:cNvSpPr txBox="1"/>
+          <p:nvPr/>
+        </p:nvSpPr>
+        <p:spPr>
+          <a:xfrm>
+            <a:off x="4237721" y="4084485"/>
+            <a:ext cx="904415" cy="276999"/>
+          </a:xfrm>
+          <a:prstGeom prst="rect">
+            <a:avLst/>
+          </a:prstGeom>
+          <a:noFill/>
+        </p:spPr>
+        <p:txBody>
+          <a:bodyPr wrap="none" rtlCol="0">
+            <a:spAutoFit/>
+          </a:bodyPr>
+          <a:lstStyle/>
+          <a:p>
+            <a:r>
+              <a:rPr lang="en-SG" sz="1200" dirty="0"/>
+              <a:t>Send chunk</a:t>
             </a:r>
           </a:p>
         </p:txBody>
       </p:sp>
       <p:cxnSp>
         <p:nvCxnSpPr>
-          <p:cNvPr id="83" name="Connector: Elbow 82">
-            <a:extLst>
-              <a:ext uri="{FF2B5EF4-FFF2-40B4-BE49-F238E27FC236}">
-                <a16:creationId xmlns:a16="http://schemas.microsoft.com/office/drawing/2014/main" id="{7389B6D4-8C36-4A23-9249-C214CFB0BB61}"/>
+          <p:cNvPr id="102" name="Straight Connector 101">
+            <a:extLst>
+              <a:ext uri="{FF2B5EF4-FFF2-40B4-BE49-F238E27FC236}">
+                <a16:creationId xmlns:a16="http://schemas.microsoft.com/office/drawing/2014/main" id="{78D852A9-91D5-4EDF-92E4-732C27E5147B}"/>
               </a:ext>
             </a:extLst>
           </p:cNvPr>
           <p:cNvCxnSpPr>
             <a:cxnSpLocks/>
-            <a:stCxn id="30" idx="3"/>
-            <a:endCxn id="45" idx="1"/>
+            <a:stCxn id="14" idx="2"/>
+            <a:endCxn id="16" idx="0"/>
           </p:cNvCxnSpPr>
           <p:nvPr/>
         </p:nvCxnSpPr>
         <p:spPr>
           <a:xfrm>
-            <a:off x="4942432" y="3207631"/>
-            <a:ext cx="3077480" cy="783731"/>
-          </a:xfrm>
-          <a:prstGeom prst="bentConnector3">
-            <a:avLst>
-              <a:gd name="adj1" fmla="val 17251"/>
-            </a:avLst>
-          </a:prstGeom>
-          <a:ln>
-            <a:tailEnd type="triangle"/>
-          </a:ln>
+            <a:off x="5882976" y="587351"/>
+            <a:ext cx="0" cy="297012"/>
+          </a:xfrm>
+          <a:prstGeom prst="line">
+            <a:avLst/>
+          </a:prstGeom>
         </p:spPr>
         <p:style>
           <a:lnRef idx="1">
@@ -7515,10 +7625,10 @@
       </p:cxnSp>
       <p:sp>
         <p:nvSpPr>
-          <p:cNvPr id="86" name="TextBox 85">
-            <a:extLst>
-              <a:ext uri="{FF2B5EF4-FFF2-40B4-BE49-F238E27FC236}">
-                <a16:creationId xmlns:a16="http://schemas.microsoft.com/office/drawing/2014/main" id="{C95ADF47-4D63-47C6-BCC9-FB3259C1DD61}"/>
+          <p:cNvPr id="106" name="TextBox 105">
+            <a:extLst>
+              <a:ext uri="{FF2B5EF4-FFF2-40B4-BE49-F238E27FC236}">
+                <a16:creationId xmlns:a16="http://schemas.microsoft.com/office/drawing/2014/main" id="{A3275474-ABFE-42B2-BCEC-BDDCD106C661}"/>
               </a:ext>
             </a:extLst>
           </p:cNvPr>
@@ -7527,8 +7637,8 @@
         </p:nvSpPr>
         <p:spPr>
           <a:xfrm>
-            <a:off x="4899597" y="2960398"/>
-            <a:ext cx="1101968" cy="276999"/>
+            <a:off x="3028538" y="800282"/>
+            <a:ext cx="2615272" cy="276999"/>
           </a:xfrm>
           <a:prstGeom prst="rect">
             <a:avLst/>
@@ -7536,42 +7646,39 @@
           <a:noFill/>
         </p:spPr>
         <p:txBody>
-          <a:bodyPr wrap="none" rtlCol="0">
+          <a:bodyPr wrap="square" rtlCol="0">
             <a:spAutoFit/>
           </a:bodyPr>
           <a:lstStyle/>
           <a:p>
             <a:r>
               <a:rPr lang="en-SG" sz="1200" dirty="0"/>
-              <a:t>Request chunk</a:t>
+              <a:t>Request filename/IP/update</a:t>
             </a:r>
           </a:p>
         </p:txBody>
       </p:sp>
       <p:cxnSp>
         <p:nvCxnSpPr>
-          <p:cNvPr id="89" name="Connector: Elbow 88">
-            <a:extLst>
-              <a:ext uri="{FF2B5EF4-FFF2-40B4-BE49-F238E27FC236}">
-                <a16:creationId xmlns:a16="http://schemas.microsoft.com/office/drawing/2014/main" id="{B69F268D-E326-4B68-BD59-B98C9877E773}"/>
+          <p:cNvPr id="11" name="Straight Arrow Connector 10">
+            <a:extLst>
+              <a:ext uri="{FF2B5EF4-FFF2-40B4-BE49-F238E27FC236}">
+                <a16:creationId xmlns:a16="http://schemas.microsoft.com/office/drawing/2014/main" id="{3CE7D051-BA48-4A7A-874E-13C496923B39}"/>
               </a:ext>
             </a:extLst>
           </p:cNvPr>
           <p:cNvCxnSpPr>
             <a:cxnSpLocks/>
-            <a:stCxn id="46" idx="1"/>
           </p:cNvCxnSpPr>
           <p:nvPr/>
         </p:nvCxnSpPr>
         <p:spPr>
-          <a:xfrm rot="10800000" flipV="1">
-            <a:off x="4237722" y="3207631"/>
-            <a:ext cx="3265476" cy="884124"/>
-          </a:xfrm>
-          <a:prstGeom prst="bentConnector3">
-            <a:avLst>
-              <a:gd name="adj1" fmla="val 20771"/>
-            </a:avLst>
+          <a:xfrm>
+            <a:off x="4942432" y="3137792"/>
+            <a:ext cx="2560766" cy="0"/>
+          </a:xfrm>
+          <a:prstGeom prst="straightConnector1">
+            <a:avLst/>
           </a:prstGeom>
           <a:ln>
             <a:tailEnd type="triangle"/>
@@ -7592,135 +7699,31 @@
           </a:fontRef>
         </p:style>
       </p:cxnSp>
-      <p:sp>
-        <p:nvSpPr>
-          <p:cNvPr id="90" name="TextBox 89">
-            <a:extLst>
-              <a:ext uri="{FF2B5EF4-FFF2-40B4-BE49-F238E27FC236}">
-                <a16:creationId xmlns:a16="http://schemas.microsoft.com/office/drawing/2014/main" id="{20247B9A-7842-4FE9-805F-0C7212068BA7}"/>
-              </a:ext>
-            </a:extLst>
-          </p:cNvPr>
-          <p:cNvSpPr txBox="1"/>
-          <p:nvPr/>
-        </p:nvSpPr>
-        <p:spPr>
-          <a:xfrm>
-            <a:off x="6444065" y="2960397"/>
-            <a:ext cx="1101968" cy="276999"/>
-          </a:xfrm>
-          <a:prstGeom prst="rect">
-            <a:avLst/>
-          </a:prstGeom>
-          <a:noFill/>
-        </p:spPr>
-        <p:txBody>
-          <a:bodyPr wrap="none" rtlCol="0">
-            <a:spAutoFit/>
-          </a:bodyPr>
-          <a:lstStyle/>
-          <a:p>
-            <a:r>
-              <a:rPr lang="en-SG" sz="1200" dirty="0"/>
-              <a:t>Request chunk</a:t>
-            </a:r>
-          </a:p>
-        </p:txBody>
-      </p:sp>
-      <p:sp>
-        <p:nvSpPr>
-          <p:cNvPr id="99" name="TextBox 98">
-            <a:extLst>
-              <a:ext uri="{FF2B5EF4-FFF2-40B4-BE49-F238E27FC236}">
-                <a16:creationId xmlns:a16="http://schemas.microsoft.com/office/drawing/2014/main" id="{33123D3C-5641-4EBD-BCBA-7F47E0D4E856}"/>
-              </a:ext>
-            </a:extLst>
-          </p:cNvPr>
-          <p:cNvSpPr txBox="1"/>
-          <p:nvPr/>
-        </p:nvSpPr>
-        <p:spPr>
-          <a:xfrm>
-            <a:off x="7082977" y="3953255"/>
-            <a:ext cx="904415" cy="276999"/>
-          </a:xfrm>
-          <a:prstGeom prst="rect">
-            <a:avLst/>
-          </a:prstGeom>
-          <a:noFill/>
-        </p:spPr>
-        <p:txBody>
-          <a:bodyPr wrap="none" rtlCol="0">
-            <a:spAutoFit/>
-          </a:bodyPr>
-          <a:lstStyle/>
-          <a:p>
-            <a:r>
-              <a:rPr lang="en-SG" sz="1200" dirty="0"/>
-              <a:t>Send chunk</a:t>
-            </a:r>
-          </a:p>
-        </p:txBody>
-      </p:sp>
-      <p:sp>
-        <p:nvSpPr>
-          <p:cNvPr id="100" name="TextBox 99">
-            <a:extLst>
-              <a:ext uri="{FF2B5EF4-FFF2-40B4-BE49-F238E27FC236}">
-                <a16:creationId xmlns:a16="http://schemas.microsoft.com/office/drawing/2014/main" id="{D99B952C-E7C2-4B7D-B4AB-78FD40FA3F18}"/>
-              </a:ext>
-            </a:extLst>
-          </p:cNvPr>
-          <p:cNvSpPr txBox="1"/>
-          <p:nvPr/>
-        </p:nvSpPr>
-        <p:spPr>
-          <a:xfrm>
-            <a:off x="4270194" y="4091754"/>
-            <a:ext cx="904415" cy="276999"/>
-          </a:xfrm>
-          <a:prstGeom prst="rect">
-            <a:avLst/>
-          </a:prstGeom>
-          <a:noFill/>
-        </p:spPr>
-        <p:txBody>
-          <a:bodyPr wrap="none" rtlCol="0">
-            <a:spAutoFit/>
-          </a:bodyPr>
-          <a:lstStyle/>
-          <a:p>
-            <a:r>
-              <a:rPr lang="en-SG" sz="1200" dirty="0"/>
-              <a:t>Send chunk</a:t>
-            </a:r>
-          </a:p>
-        </p:txBody>
-      </p:sp>
       <p:cxnSp>
         <p:nvCxnSpPr>
-          <p:cNvPr id="102" name="Straight Connector 101">
-            <a:extLst>
-              <a:ext uri="{FF2B5EF4-FFF2-40B4-BE49-F238E27FC236}">
-                <a16:creationId xmlns:a16="http://schemas.microsoft.com/office/drawing/2014/main" id="{78D852A9-91D5-4EDF-92E4-732C27E5147B}"/>
+          <p:cNvPr id="13" name="Straight Arrow Connector 12">
+            <a:extLst>
+              <a:ext uri="{FF2B5EF4-FFF2-40B4-BE49-F238E27FC236}">
+                <a16:creationId xmlns:a16="http://schemas.microsoft.com/office/drawing/2014/main" id="{3E0740FF-436A-4B91-B5E4-54F26430DD81}"/>
               </a:ext>
             </a:extLst>
           </p:cNvPr>
           <p:cNvCxnSpPr>
             <a:cxnSpLocks/>
-            <a:stCxn id="14" idx="2"/>
-            <a:endCxn id="16" idx="0"/>
           </p:cNvCxnSpPr>
           <p:nvPr/>
         </p:nvCxnSpPr>
         <p:spPr>
-          <a:xfrm>
-            <a:off x="5882976" y="587351"/>
-            <a:ext cx="0" cy="297012"/>
-          </a:xfrm>
-          <a:prstGeom prst="line">
-            <a:avLst/>
-          </a:prstGeom>
+          <a:xfrm flipH="1">
+            <a:off x="4942432" y="3282717"/>
+            <a:ext cx="2560766" cy="0"/>
+          </a:xfrm>
+          <a:prstGeom prst="straightConnector1">
+            <a:avLst/>
+          </a:prstGeom>
+          <a:ln>
+            <a:tailEnd type="triangle"/>
+          </a:ln>
         </p:spPr>
         <p:style>
           <a:lnRef idx="1">
@@ -7737,41 +7740,176 @@
           </a:fontRef>
         </p:style>
       </p:cxnSp>
-      <p:sp>
-        <p:nvSpPr>
-          <p:cNvPr id="106" name="TextBox 105">
-            <a:extLst>
-              <a:ext uri="{FF2B5EF4-FFF2-40B4-BE49-F238E27FC236}">
-                <a16:creationId xmlns:a16="http://schemas.microsoft.com/office/drawing/2014/main" id="{A3275474-ABFE-42B2-BCEC-BDDCD106C661}"/>
-              </a:ext>
-            </a:extLst>
-          </p:cNvPr>
-          <p:cNvSpPr txBox="1"/>
-          <p:nvPr/>
-        </p:nvSpPr>
-        <p:spPr>
-          <a:xfrm>
-            <a:off x="1515662" y="1671369"/>
-            <a:ext cx="2615272" cy="276999"/>
-          </a:xfrm>
-          <a:prstGeom prst="rect">
-            <a:avLst/>
-          </a:prstGeom>
-          <a:noFill/>
-        </p:spPr>
-        <p:txBody>
-          <a:bodyPr wrap="square" rtlCol="0">
-            <a:spAutoFit/>
-          </a:bodyPr>
-          <a:lstStyle/>
-          <a:p>
-            <a:r>
-              <a:rPr lang="en-SG" sz="1200" dirty="0"/>
-              <a:t>Request filename/IP/update</a:t>
-            </a:r>
-          </a:p>
-        </p:txBody>
-      </p:sp>
+      <p:cxnSp>
+        <p:nvCxnSpPr>
+          <p:cNvPr id="54" name="Straight Arrow Connector 53">
+            <a:extLst>
+              <a:ext uri="{FF2B5EF4-FFF2-40B4-BE49-F238E27FC236}">
+                <a16:creationId xmlns:a16="http://schemas.microsoft.com/office/drawing/2014/main" id="{7F3DBEA3-DA97-44D4-A1B8-6ABCF09C7D64}"/>
+              </a:ext>
+            </a:extLst>
+          </p:cNvPr>
+          <p:cNvCxnSpPr>
+            <a:cxnSpLocks/>
+          </p:cNvCxnSpPr>
+          <p:nvPr/>
+        </p:nvCxnSpPr>
+        <p:spPr>
+          <a:xfrm flipV="1">
+            <a:off x="4237721" y="4091754"/>
+            <a:ext cx="3782191" cy="5539"/>
+          </a:xfrm>
+          <a:prstGeom prst="straightConnector1">
+            <a:avLst/>
+          </a:prstGeom>
+          <a:ln>
+            <a:tailEnd type="triangle"/>
+          </a:ln>
+        </p:spPr>
+        <p:style>
+          <a:lnRef idx="1">
+            <a:schemeClr val="accent1"/>
+          </a:lnRef>
+          <a:fillRef idx="0">
+            <a:schemeClr val="accent1"/>
+          </a:fillRef>
+          <a:effectRef idx="0">
+            <a:schemeClr val="accent1"/>
+          </a:effectRef>
+          <a:fontRef idx="minor">
+            <a:schemeClr val="tx1"/>
+          </a:fontRef>
+        </p:style>
+      </p:cxnSp>
+      <p:cxnSp>
+        <p:nvCxnSpPr>
+          <p:cNvPr id="55" name="Straight Arrow Connector 54">
+            <a:extLst>
+              <a:ext uri="{FF2B5EF4-FFF2-40B4-BE49-F238E27FC236}">
+                <a16:creationId xmlns:a16="http://schemas.microsoft.com/office/drawing/2014/main" id="{9200BDA0-CFC3-4116-9A97-217B6F513E3C}"/>
+              </a:ext>
+            </a:extLst>
+          </p:cNvPr>
+          <p:cNvCxnSpPr>
+            <a:cxnSpLocks/>
+          </p:cNvCxnSpPr>
+          <p:nvPr/>
+        </p:nvCxnSpPr>
+        <p:spPr>
+          <a:xfrm flipH="1">
+            <a:off x="4237721" y="3902873"/>
+            <a:ext cx="3782191" cy="5539"/>
+          </a:xfrm>
+          <a:prstGeom prst="straightConnector1">
+            <a:avLst/>
+          </a:prstGeom>
+          <a:ln>
+            <a:tailEnd type="triangle"/>
+          </a:ln>
+        </p:spPr>
+        <p:style>
+          <a:lnRef idx="1">
+            <a:schemeClr val="accent1"/>
+          </a:lnRef>
+          <a:fillRef idx="0">
+            <a:schemeClr val="accent1"/>
+          </a:fillRef>
+          <a:effectRef idx="0">
+            <a:schemeClr val="accent1"/>
+          </a:effectRef>
+          <a:fontRef idx="minor">
+            <a:schemeClr val="tx1"/>
+          </a:fontRef>
+        </p:style>
+      </p:cxnSp>
+      <p:cxnSp>
+        <p:nvCxnSpPr>
+          <p:cNvPr id="59" name="Connector: Elbow 58">
+            <a:extLst>
+              <a:ext uri="{FF2B5EF4-FFF2-40B4-BE49-F238E27FC236}">
+                <a16:creationId xmlns:a16="http://schemas.microsoft.com/office/drawing/2014/main" id="{CA453BC7-C0C6-499B-B80D-BD4E1E83BC1E}"/>
+              </a:ext>
+            </a:extLst>
+          </p:cNvPr>
+          <p:cNvCxnSpPr>
+            <a:cxnSpLocks/>
+            <a:endCxn id="21" idx="3"/>
+          </p:cNvCxnSpPr>
+          <p:nvPr/>
+        </p:nvCxnSpPr>
+        <p:spPr>
+          <a:xfrm rot="10800000" flipV="1">
+            <a:off x="4237721" y="1183301"/>
+            <a:ext cx="1186958" cy="1182784"/>
+          </a:xfrm>
+          <a:prstGeom prst="bentConnector3">
+            <a:avLst>
+              <a:gd name="adj1" fmla="val 32747"/>
+            </a:avLst>
+          </a:prstGeom>
+          <a:ln>
+            <a:tailEnd type="triangle"/>
+          </a:ln>
+        </p:spPr>
+        <p:style>
+          <a:lnRef idx="1">
+            <a:schemeClr val="accent1"/>
+          </a:lnRef>
+          <a:fillRef idx="0">
+            <a:schemeClr val="accent1"/>
+          </a:fillRef>
+          <a:effectRef idx="0">
+            <a:schemeClr val="accent1"/>
+          </a:effectRef>
+          <a:fontRef idx="minor">
+            <a:schemeClr val="tx1"/>
+          </a:fontRef>
+        </p:style>
+      </p:cxnSp>
+      <p:cxnSp>
+        <p:nvCxnSpPr>
+          <p:cNvPr id="68" name="Connector: Elbow 67">
+            <a:extLst>
+              <a:ext uri="{FF2B5EF4-FFF2-40B4-BE49-F238E27FC236}">
+                <a16:creationId xmlns:a16="http://schemas.microsoft.com/office/drawing/2014/main" id="{B35A97CB-53CC-4037-8DF3-CFC3EBBB363A}"/>
+              </a:ext>
+            </a:extLst>
+          </p:cNvPr>
+          <p:cNvCxnSpPr>
+            <a:cxnSpLocks/>
+            <a:endCxn id="44" idx="1"/>
+          </p:cNvCxnSpPr>
+          <p:nvPr/>
+        </p:nvCxnSpPr>
+        <p:spPr>
+          <a:xfrm>
+            <a:off x="6327383" y="1178697"/>
+            <a:ext cx="1692529" cy="1181849"/>
+          </a:xfrm>
+          <a:prstGeom prst="bentConnector3">
+            <a:avLst>
+              <a:gd name="adj1" fmla="val 50000"/>
+            </a:avLst>
+          </a:prstGeom>
+          <a:ln>
+            <a:tailEnd type="triangle"/>
+          </a:ln>
+        </p:spPr>
+        <p:style>
+          <a:lnRef idx="1">
+            <a:schemeClr val="accent1"/>
+          </a:lnRef>
+          <a:fillRef idx="0">
+            <a:schemeClr val="accent1"/>
+          </a:fillRef>
+          <a:effectRef idx="0">
+            <a:schemeClr val="accent1"/>
+          </a:effectRef>
+          <a:fontRef idx="minor">
+            <a:schemeClr val="tx1"/>
+          </a:fontRef>
+        </p:style>
+      </p:cxnSp>
     </p:spTree>
     <p:extLst>
       <p:ext uri="{BB962C8B-B14F-4D97-AF65-F5344CB8AC3E}">

</xml_diff>

<commit_message>
Changes to images and pptx
</commit_message>
<xml_diff>
--- a/image/CS3103.pptx
+++ b/image/CS3103.pptx
@@ -4555,7 +4555,7 @@
         <p:spPr>
           <a:xfrm>
             <a:off x="5439677" y="560653"/>
-            <a:ext cx="0" cy="5885755"/>
+            <a:ext cx="0" cy="6013683"/>
           </a:xfrm>
           <a:prstGeom prst="straightConnector1">
             <a:avLst/>
@@ -4638,7 +4638,7 @@
         <p:spPr>
           <a:xfrm>
             <a:off x="7454251" y="560653"/>
-            <a:ext cx="0" cy="5885755"/>
+            <a:ext cx="0" cy="6013683"/>
           </a:xfrm>
           <a:prstGeom prst="straightConnector1">
             <a:avLst/>
@@ -4679,7 +4679,7 @@
         <p:spPr>
           <a:xfrm>
             <a:off x="3490732" y="560653"/>
-            <a:ext cx="0" cy="5885755"/>
+            <a:ext cx="0" cy="6013683"/>
           </a:xfrm>
           <a:prstGeom prst="straightConnector1">
             <a:avLst/>
@@ -4929,7 +4929,7 @@
         </p:nvCxnSpPr>
         <p:spPr>
           <a:xfrm>
-            <a:off x="3468505" y="3256017"/>
+            <a:off x="3478519" y="3063016"/>
             <a:ext cx="1948945" cy="209131"/>
           </a:xfrm>
           <a:prstGeom prst="straightConnector1">
@@ -4971,50 +4971,8 @@
         </p:nvCxnSpPr>
         <p:spPr>
           <a:xfrm flipH="1">
-            <a:off x="3505465" y="4001658"/>
+            <a:off x="3475183" y="3544620"/>
             <a:ext cx="1942268" cy="200234"/>
-          </a:xfrm>
-          <a:prstGeom prst="straightConnector1">
-            <a:avLst/>
-          </a:prstGeom>
-          <a:ln w="19050">
-            <a:prstDash val="dash"/>
-            <a:tailEnd type="triangle"/>
-          </a:ln>
-        </p:spPr>
-        <p:style>
-          <a:lnRef idx="1">
-            <a:schemeClr val="accent1"/>
-          </a:lnRef>
-          <a:fillRef idx="0">
-            <a:schemeClr val="accent1"/>
-          </a:fillRef>
-          <a:effectRef idx="0">
-            <a:schemeClr val="accent1"/>
-          </a:effectRef>
-          <a:fontRef idx="minor">
-            <a:schemeClr val="tx1"/>
-          </a:fontRef>
-        </p:style>
-      </p:cxnSp>
-      <p:cxnSp>
-        <p:nvCxnSpPr>
-          <p:cNvPr id="37" name="Straight Arrow Connector 36">
-            <a:extLst>
-              <a:ext uri="{FF2B5EF4-FFF2-40B4-BE49-F238E27FC236}">
-                <a16:creationId xmlns:a16="http://schemas.microsoft.com/office/drawing/2014/main" id="{25465AFC-B13F-4F33-820B-5B23289A48E0}"/>
-              </a:ext>
-            </a:extLst>
-          </p:cNvPr>
-          <p:cNvCxnSpPr>
-            <a:cxnSpLocks/>
-          </p:cNvCxnSpPr>
-          <p:nvPr/>
-        </p:nvCxnSpPr>
-        <p:spPr>
-          <a:xfrm>
-            <a:off x="3492113" y="4287548"/>
-            <a:ext cx="1948945" cy="209131"/>
           </a:xfrm>
           <a:prstGeom prst="straightConnector1">
             <a:avLst/>
@@ -5055,7 +5013,7 @@
         </p:nvCxnSpPr>
         <p:spPr>
           <a:xfrm>
-            <a:off x="3492112" y="4769223"/>
+            <a:off x="3478314" y="4001409"/>
             <a:ext cx="1948945" cy="209131"/>
           </a:xfrm>
           <a:prstGeom prst="straightConnector1">
@@ -5251,7 +5209,7 @@
           <a:p>
             <a:r>
               <a:rPr lang="en-SG" sz="1200" dirty="0"/>
-              <a:t>Request Text.txt chuck 1 </a:t>
+              <a:t>Request Text.txt chunk 1 </a:t>
             </a:r>
           </a:p>
         </p:txBody>
@@ -5270,7 +5228,7 @@
         </p:nvSpPr>
         <p:spPr>
           <a:xfrm rot="457508">
-            <a:off x="3433501" y="2993286"/>
+            <a:off x="3440178" y="2904701"/>
             <a:ext cx="2018951" cy="276999"/>
           </a:xfrm>
           <a:prstGeom prst="rect">
@@ -5305,7 +5263,7 @@
         </p:nvSpPr>
         <p:spPr>
           <a:xfrm rot="21272344">
-            <a:off x="3661250" y="3847507"/>
+            <a:off x="3630968" y="3390469"/>
             <a:ext cx="1732782" cy="276999"/>
           </a:xfrm>
           <a:prstGeom prst="rect">
@@ -5340,8 +5298,8 @@
         </p:nvSpPr>
         <p:spPr>
           <a:xfrm rot="457508">
-            <a:off x="3478285" y="4513012"/>
-            <a:ext cx="2018951" cy="276999"/>
+            <a:off x="3564983" y="3843970"/>
+            <a:ext cx="1829347" cy="276999"/>
           </a:xfrm>
           <a:prstGeom prst="rect">
             <a:avLst/>
@@ -5356,7 +5314,7 @@
           <a:p>
             <a:r>
               <a:rPr lang="en-SG" sz="1200" dirty="0"/>
-              <a:t>Text.txt chunk 4 Data Transfer</a:t>
+              <a:t>Time out or chunk missing</a:t>
             </a:r>
           </a:p>
         </p:txBody>
@@ -5482,7 +5440,7 @@
         </p:nvCxnSpPr>
         <p:spPr>
           <a:xfrm>
-            <a:off x="5462918" y="3850061"/>
+            <a:off x="5463580" y="3379048"/>
             <a:ext cx="1988988" cy="254741"/>
           </a:xfrm>
           <a:prstGeom prst="straightConnector1">
@@ -5522,7 +5480,7 @@
         </p:nvSpPr>
         <p:spPr>
           <a:xfrm rot="457508">
-            <a:off x="5519113" y="3713722"/>
+            <a:off x="5519775" y="3242709"/>
             <a:ext cx="1876604" cy="276999"/>
           </a:xfrm>
           <a:prstGeom prst="rect">
@@ -5559,7 +5517,7 @@
         </p:nvCxnSpPr>
         <p:spPr>
           <a:xfrm>
-            <a:off x="5447732" y="5196059"/>
+            <a:off x="5449399" y="6099583"/>
             <a:ext cx="1988988" cy="254741"/>
           </a:xfrm>
           <a:prstGeom prst="straightConnector1">
@@ -5599,7 +5557,7 @@
         </p:nvSpPr>
         <p:spPr>
           <a:xfrm rot="457508">
-            <a:off x="5503927" y="5059720"/>
+            <a:off x="5505594" y="5963244"/>
             <a:ext cx="1876604" cy="276999"/>
           </a:xfrm>
           <a:prstGeom prst="rect">
@@ -5636,7 +5594,7 @@
         </p:nvCxnSpPr>
         <p:spPr>
           <a:xfrm>
-            <a:off x="5440221" y="4414480"/>
+            <a:off x="5460017" y="4302749"/>
             <a:ext cx="1988988" cy="254741"/>
           </a:xfrm>
           <a:prstGeom prst="straightConnector1">
@@ -5676,7 +5634,7 @@
         </p:nvSpPr>
         <p:spPr>
           <a:xfrm rot="457508">
-            <a:off x="5425474" y="4275981"/>
+            <a:off x="5445270" y="4164250"/>
             <a:ext cx="2033505" cy="276999"/>
           </a:xfrm>
           <a:prstGeom prst="rect">
@@ -5711,8 +5669,8 @@
         </p:nvSpPr>
         <p:spPr>
           <a:xfrm rot="457508">
-            <a:off x="5963539" y="4516145"/>
-            <a:ext cx="954620" cy="276999"/>
+            <a:off x="5789821" y="4404414"/>
+            <a:ext cx="1341649" cy="276999"/>
           </a:xfrm>
           <a:prstGeom prst="rect">
             <a:avLst/>
@@ -5731,11 +5689,408 @@
                   <a:srgbClr val="C00000"/>
                 </a:solidFill>
               </a:rPr>
-              <a:t>Every 15 sec</a:t>
-            </a:r>
-          </a:p>
-        </p:txBody>
-      </p:sp>
+              <a:t>When request fails</a:t>
+            </a:r>
+          </a:p>
+        </p:txBody>
+      </p:sp>
+      <p:cxnSp>
+        <p:nvCxnSpPr>
+          <p:cNvPr id="35" name="Straight Arrow Connector 34">
+            <a:extLst>
+              <a:ext uri="{FF2B5EF4-FFF2-40B4-BE49-F238E27FC236}">
+                <a16:creationId xmlns:a16="http://schemas.microsoft.com/office/drawing/2014/main" id="{E228CC9A-E6B0-464E-8739-875D498378AE}"/>
+              </a:ext>
+            </a:extLst>
+          </p:cNvPr>
+          <p:cNvCxnSpPr>
+            <a:cxnSpLocks/>
+          </p:cNvCxnSpPr>
+          <p:nvPr/>
+        </p:nvCxnSpPr>
+        <p:spPr>
+          <a:xfrm flipH="1">
+            <a:off x="3488536" y="5124863"/>
+            <a:ext cx="1942268" cy="200234"/>
+          </a:xfrm>
+          <a:prstGeom prst="straightConnector1">
+            <a:avLst/>
+          </a:prstGeom>
+          <a:ln w="19050">
+            <a:prstDash val="dash"/>
+            <a:tailEnd type="triangle"/>
+          </a:ln>
+        </p:spPr>
+        <p:style>
+          <a:lnRef idx="1">
+            <a:schemeClr val="accent1"/>
+          </a:lnRef>
+          <a:fillRef idx="0">
+            <a:schemeClr val="accent1"/>
+          </a:fillRef>
+          <a:effectRef idx="0">
+            <a:schemeClr val="accent1"/>
+          </a:effectRef>
+          <a:fontRef idx="minor">
+            <a:schemeClr val="tx1"/>
+          </a:fontRef>
+        </p:style>
+      </p:cxnSp>
+      <p:cxnSp>
+        <p:nvCxnSpPr>
+          <p:cNvPr id="39" name="Straight Arrow Connector 38">
+            <a:extLst>
+              <a:ext uri="{FF2B5EF4-FFF2-40B4-BE49-F238E27FC236}">
+                <a16:creationId xmlns:a16="http://schemas.microsoft.com/office/drawing/2014/main" id="{B5BA97C3-9B41-44B9-8434-95A0A299B892}"/>
+              </a:ext>
+            </a:extLst>
+          </p:cNvPr>
+          <p:cNvCxnSpPr>
+            <a:cxnSpLocks/>
+          </p:cNvCxnSpPr>
+          <p:nvPr/>
+        </p:nvCxnSpPr>
+        <p:spPr>
+          <a:xfrm>
+            <a:off x="3475184" y="5410753"/>
+            <a:ext cx="1948945" cy="209131"/>
+          </a:xfrm>
+          <a:prstGeom prst="straightConnector1">
+            <a:avLst/>
+          </a:prstGeom>
+          <a:ln w="19050">
+            <a:prstDash val="dash"/>
+            <a:tailEnd type="triangle"/>
+          </a:ln>
+        </p:spPr>
+        <p:style>
+          <a:lnRef idx="1">
+            <a:schemeClr val="accent1"/>
+          </a:lnRef>
+          <a:fillRef idx="0">
+            <a:schemeClr val="accent1"/>
+          </a:fillRef>
+          <a:effectRef idx="0">
+            <a:schemeClr val="accent1"/>
+          </a:effectRef>
+          <a:fontRef idx="minor">
+            <a:schemeClr val="tx1"/>
+          </a:fontRef>
+        </p:style>
+      </p:cxnSp>
+      <p:cxnSp>
+        <p:nvCxnSpPr>
+          <p:cNvPr id="40" name="Straight Arrow Connector 39">
+            <a:extLst>
+              <a:ext uri="{FF2B5EF4-FFF2-40B4-BE49-F238E27FC236}">
+                <a16:creationId xmlns:a16="http://schemas.microsoft.com/office/drawing/2014/main" id="{ACC1385D-B2D8-4257-B7AC-B1F66E763D9F}"/>
+              </a:ext>
+            </a:extLst>
+          </p:cNvPr>
+          <p:cNvCxnSpPr>
+            <a:cxnSpLocks/>
+          </p:cNvCxnSpPr>
+          <p:nvPr/>
+        </p:nvCxnSpPr>
+        <p:spPr>
+          <a:xfrm>
+            <a:off x="3488536" y="5779266"/>
+            <a:ext cx="1948945" cy="209131"/>
+          </a:xfrm>
+          <a:prstGeom prst="straightConnector1">
+            <a:avLst/>
+          </a:prstGeom>
+          <a:ln w="19050">
+            <a:prstDash val="dash"/>
+            <a:tailEnd type="triangle"/>
+          </a:ln>
+        </p:spPr>
+        <p:style>
+          <a:lnRef idx="1">
+            <a:schemeClr val="accent1"/>
+          </a:lnRef>
+          <a:fillRef idx="0">
+            <a:schemeClr val="accent1"/>
+          </a:fillRef>
+          <a:effectRef idx="0">
+            <a:schemeClr val="accent1"/>
+          </a:effectRef>
+          <a:fontRef idx="minor">
+            <a:schemeClr val="tx1"/>
+          </a:fontRef>
+        </p:style>
+      </p:cxnSp>
+      <p:sp>
+        <p:nvSpPr>
+          <p:cNvPr id="49" name="TextBox 48">
+            <a:extLst>
+              <a:ext uri="{FF2B5EF4-FFF2-40B4-BE49-F238E27FC236}">
+                <a16:creationId xmlns:a16="http://schemas.microsoft.com/office/drawing/2014/main" id="{8890EC4E-140C-4956-BFCA-31A778345114}"/>
+              </a:ext>
+            </a:extLst>
+          </p:cNvPr>
+          <p:cNvSpPr txBox="1"/>
+          <p:nvPr/>
+        </p:nvSpPr>
+        <p:spPr>
+          <a:xfrm rot="21272344">
+            <a:off x="3623144" y="4964192"/>
+            <a:ext cx="1732782" cy="276999"/>
+          </a:xfrm>
+          <a:prstGeom prst="rect">
+            <a:avLst/>
+          </a:prstGeom>
+          <a:noFill/>
+        </p:spPr>
+        <p:txBody>
+          <a:bodyPr wrap="none" rtlCol="0">
+            <a:spAutoFit/>
+          </a:bodyPr>
+          <a:lstStyle/>
+          <a:p>
+            <a:r>
+              <a:rPr lang="en-SG" sz="1200" dirty="0"/>
+              <a:t>Request Text.txt chunk 4 </a:t>
+            </a:r>
+          </a:p>
+        </p:txBody>
+      </p:sp>
+      <p:sp>
+        <p:nvSpPr>
+          <p:cNvPr id="50" name="TextBox 49">
+            <a:extLst>
+              <a:ext uri="{FF2B5EF4-FFF2-40B4-BE49-F238E27FC236}">
+                <a16:creationId xmlns:a16="http://schemas.microsoft.com/office/drawing/2014/main" id="{C997EF73-28C2-4EBB-A7A2-FF791E7C2BCA}"/>
+              </a:ext>
+            </a:extLst>
+          </p:cNvPr>
+          <p:cNvSpPr txBox="1"/>
+          <p:nvPr/>
+        </p:nvSpPr>
+        <p:spPr>
+          <a:xfrm rot="457508">
+            <a:off x="3450194" y="5570624"/>
+            <a:ext cx="2018951" cy="276999"/>
+          </a:xfrm>
+          <a:prstGeom prst="rect">
+            <a:avLst/>
+          </a:prstGeom>
+          <a:noFill/>
+        </p:spPr>
+        <p:txBody>
+          <a:bodyPr wrap="none" rtlCol="0">
+            <a:spAutoFit/>
+          </a:bodyPr>
+          <a:lstStyle/>
+          <a:p>
+            <a:r>
+              <a:rPr lang="en-SG" sz="1200" dirty="0"/>
+              <a:t>Text.txt chunk 4 Data Transfer</a:t>
+            </a:r>
+          </a:p>
+        </p:txBody>
+      </p:sp>
+      <p:cxnSp>
+        <p:nvCxnSpPr>
+          <p:cNvPr id="60" name="Straight Arrow Connector 59">
+            <a:extLst>
+              <a:ext uri="{FF2B5EF4-FFF2-40B4-BE49-F238E27FC236}">
+                <a16:creationId xmlns:a16="http://schemas.microsoft.com/office/drawing/2014/main" id="{529F9EF8-190E-4370-9474-9128EA81707D}"/>
+              </a:ext>
+            </a:extLst>
+          </p:cNvPr>
+          <p:cNvCxnSpPr>
+            <a:cxnSpLocks/>
+          </p:cNvCxnSpPr>
+          <p:nvPr/>
+        </p:nvCxnSpPr>
+        <p:spPr>
+          <a:xfrm flipH="1">
+            <a:off x="5480263" y="4855835"/>
+            <a:ext cx="1942268" cy="200234"/>
+          </a:xfrm>
+          <a:prstGeom prst="straightConnector1">
+            <a:avLst/>
+          </a:prstGeom>
+          <a:ln w="19050">
+            <a:prstDash val="dash"/>
+            <a:tailEnd type="triangle"/>
+          </a:ln>
+        </p:spPr>
+        <p:style>
+          <a:lnRef idx="1">
+            <a:schemeClr val="accent1"/>
+          </a:lnRef>
+          <a:fillRef idx="0">
+            <a:schemeClr val="accent1"/>
+          </a:fillRef>
+          <a:effectRef idx="0">
+            <a:schemeClr val="accent1"/>
+          </a:effectRef>
+          <a:fontRef idx="minor">
+            <a:schemeClr val="tx1"/>
+          </a:fontRef>
+        </p:style>
+      </p:cxnSp>
+      <p:sp>
+        <p:nvSpPr>
+          <p:cNvPr id="61" name="TextBox 60">
+            <a:extLst>
+              <a:ext uri="{FF2B5EF4-FFF2-40B4-BE49-F238E27FC236}">
+                <a16:creationId xmlns:a16="http://schemas.microsoft.com/office/drawing/2014/main" id="{1E7DD8E3-BE70-4A94-9CF2-555CCC64F29C}"/>
+              </a:ext>
+            </a:extLst>
+          </p:cNvPr>
+          <p:cNvSpPr txBox="1"/>
+          <p:nvPr/>
+        </p:nvSpPr>
+        <p:spPr>
+          <a:xfrm rot="21272344">
+            <a:off x="5453928" y="4696059"/>
+            <a:ext cx="2084801" cy="276999"/>
+          </a:xfrm>
+          <a:prstGeom prst="rect">
+            <a:avLst/>
+          </a:prstGeom>
+          <a:noFill/>
+        </p:spPr>
+        <p:txBody>
+          <a:bodyPr wrap="none" rtlCol="0">
+            <a:spAutoFit/>
+          </a:bodyPr>
+          <a:lstStyle/>
+          <a:p>
+            <a:r>
+              <a:rPr lang="en-SG" sz="1200" dirty="0"/>
+              <a:t>Reply list of IP and chunks no.</a:t>
+            </a:r>
+          </a:p>
+        </p:txBody>
+      </p:sp>
+      <p:sp>
+        <p:nvSpPr>
+          <p:cNvPr id="9" name="Left Brace 8">
+            <a:extLst>
+              <a:ext uri="{FF2B5EF4-FFF2-40B4-BE49-F238E27FC236}">
+                <a16:creationId xmlns:a16="http://schemas.microsoft.com/office/drawing/2014/main" id="{5262A3BB-18A9-4C3C-BE5D-2C659B897ABD}"/>
+              </a:ext>
+            </a:extLst>
+          </p:cNvPr>
+          <p:cNvSpPr/>
+          <p:nvPr/>
+        </p:nvSpPr>
+        <p:spPr>
+          <a:xfrm>
+            <a:off x="3205705" y="4999165"/>
+            <a:ext cx="132082" cy="1368263"/>
+          </a:xfrm>
+          <a:prstGeom prst="leftBrace">
+            <a:avLst/>
+          </a:prstGeom>
+        </p:spPr>
+        <p:style>
+          <a:lnRef idx="1">
+            <a:schemeClr val="accent1"/>
+          </a:lnRef>
+          <a:fillRef idx="0">
+            <a:schemeClr val="accent1"/>
+          </a:fillRef>
+          <a:effectRef idx="0">
+            <a:schemeClr val="accent1"/>
+          </a:effectRef>
+          <a:fontRef idx="minor">
+            <a:schemeClr val="tx1"/>
+          </a:fontRef>
+        </p:style>
+        <p:txBody>
+          <a:bodyPr rtlCol="0" anchor="ctr"/>
+          <a:lstStyle/>
+          <a:p>
+            <a:pPr algn="ctr"/>
+            <a:endParaRPr lang="en-SG"/>
+          </a:p>
+        </p:txBody>
+      </p:sp>
+      <p:sp>
+        <p:nvSpPr>
+          <p:cNvPr id="62" name="TextBox 61">
+            <a:extLst>
+              <a:ext uri="{FF2B5EF4-FFF2-40B4-BE49-F238E27FC236}">
+                <a16:creationId xmlns:a16="http://schemas.microsoft.com/office/drawing/2014/main" id="{73DD974A-A487-46D3-B90A-6693166B0930}"/>
+              </a:ext>
+            </a:extLst>
+          </p:cNvPr>
+          <p:cNvSpPr txBox="1"/>
+          <p:nvPr/>
+        </p:nvSpPr>
+        <p:spPr>
+          <a:xfrm>
+            <a:off x="2215688" y="5544796"/>
+            <a:ext cx="1056058" cy="276999"/>
+          </a:xfrm>
+          <a:prstGeom prst="rect">
+            <a:avLst/>
+          </a:prstGeom>
+          <a:noFill/>
+        </p:spPr>
+        <p:txBody>
+          <a:bodyPr wrap="none" rtlCol="0">
+            <a:spAutoFit/>
+          </a:bodyPr>
+          <a:lstStyle/>
+          <a:p>
+            <a:r>
+              <a:rPr lang="en-SG" sz="1200" dirty="0"/>
+              <a:t>Different Peer</a:t>
+            </a:r>
+          </a:p>
+        </p:txBody>
+      </p:sp>
+      <p:cxnSp>
+        <p:nvCxnSpPr>
+          <p:cNvPr id="12" name="Connector: Curved 11">
+            <a:extLst>
+              <a:ext uri="{FF2B5EF4-FFF2-40B4-BE49-F238E27FC236}">
+                <a16:creationId xmlns:a16="http://schemas.microsoft.com/office/drawing/2014/main" id="{84FE2D5F-D982-4A00-947A-59B5A3D6FB75}"/>
+              </a:ext>
+            </a:extLst>
+          </p:cNvPr>
+          <p:cNvCxnSpPr>
+            <a:stCxn id="47" idx="1"/>
+            <a:endCxn id="53" idx="2"/>
+          </p:cNvCxnSpPr>
+          <p:nvPr/>
+        </p:nvCxnSpPr>
+        <p:spPr>
+          <a:xfrm rot="10800000">
+            <a:off x="4461279" y="4119745"/>
+            <a:ext cx="1334474" cy="334157"/>
+          </a:xfrm>
+          <a:prstGeom prst="curvedConnector2">
+            <a:avLst/>
+          </a:prstGeom>
+          <a:ln>
+            <a:solidFill>
+              <a:srgbClr val="C00000"/>
+            </a:solidFill>
+            <a:tailEnd type="triangle"/>
+          </a:ln>
+        </p:spPr>
+        <p:style>
+          <a:lnRef idx="1">
+            <a:schemeClr val="accent1"/>
+          </a:lnRef>
+          <a:fillRef idx="0">
+            <a:schemeClr val="accent1"/>
+          </a:fillRef>
+          <a:effectRef idx="0">
+            <a:schemeClr val="accent1"/>
+          </a:effectRef>
+          <a:fontRef idx="minor">
+            <a:schemeClr val="tx1"/>
+          </a:fontRef>
+        </p:style>
+      </p:cxnSp>
     </p:spTree>
     <p:extLst>
       <p:ext uri="{BB962C8B-B14F-4D97-AF65-F5344CB8AC3E}">
@@ -6081,7 +6436,7 @@
                   <a:schemeClr val="tx1"/>
                 </a:solidFill>
               </a:rPr>
-              <a:t>Array to check downloaded chunks</a:t>
+              <a:t>Boolean array to check downloaded chunks</a:t>
             </a:r>
           </a:p>
           <a:p>
@@ -6347,7 +6702,18 @@
                   <a:schemeClr val="tx1"/>
                 </a:solidFill>
               </a:rPr>
-              <a:t>UDP Port 80</a:t>
+              <a:t>UDP Port</a:t>
+            </a:r>
+          </a:p>
+          <a:p>
+            <a:pPr algn="ctr"/>
+            <a:r>
+              <a:rPr lang="en-SG" sz="1200" dirty="0">
+                <a:solidFill>
+                  <a:schemeClr val="tx1"/>
+                </a:solidFill>
+              </a:rPr>
+              <a:t>Random</a:t>
             </a:r>
           </a:p>
         </p:txBody>
@@ -6590,60 +6956,6 @@
           </a:p>
         </p:txBody>
       </p:sp>
-      <p:sp>
-        <p:nvSpPr>
-          <p:cNvPr id="33" name="Rectangle 32">
-            <a:extLst>
-              <a:ext uri="{FF2B5EF4-FFF2-40B4-BE49-F238E27FC236}">
-                <a16:creationId xmlns:a16="http://schemas.microsoft.com/office/drawing/2014/main" id="{D9FBED2C-D2E2-43CA-AFBF-7ABA0D1DC633}"/>
-              </a:ext>
-            </a:extLst>
-          </p:cNvPr>
-          <p:cNvSpPr/>
-          <p:nvPr/>
-        </p:nvSpPr>
-        <p:spPr>
-          <a:xfrm>
-            <a:off x="3348907" y="1967841"/>
-            <a:ext cx="888814" cy="223594"/>
-          </a:xfrm>
-          <a:prstGeom prst="rect">
-            <a:avLst/>
-          </a:prstGeom>
-          <a:noFill/>
-        </p:spPr>
-        <p:style>
-          <a:lnRef idx="2">
-            <a:schemeClr val="accent1">
-              <a:shade val="50000"/>
-            </a:schemeClr>
-          </a:lnRef>
-          <a:fillRef idx="1">
-            <a:schemeClr val="accent1"/>
-          </a:fillRef>
-          <a:effectRef idx="0">
-            <a:schemeClr val="accent1"/>
-          </a:effectRef>
-          <a:fontRef idx="minor">
-            <a:schemeClr val="lt1"/>
-          </a:fontRef>
-        </p:style>
-        <p:txBody>
-          <a:bodyPr rtlCol="0" anchor="ctr"/>
-          <a:lstStyle/>
-          <a:p>
-            <a:pPr algn="ctr"/>
-            <a:r>
-              <a:rPr lang="en-SG" sz="1400" dirty="0">
-                <a:solidFill>
-                  <a:schemeClr val="tx1"/>
-                </a:solidFill>
-              </a:rPr>
-              <a:t>Tracker</a:t>
-            </a:r>
-          </a:p>
-        </p:txBody>
-      </p:sp>
       <p:cxnSp>
         <p:nvCxnSpPr>
           <p:cNvPr id="35" name="Straight Connector 34">
@@ -6666,6 +6978,7 @@
           <a:prstGeom prst="line">
             <a:avLst/>
           </a:prstGeom>
+          <a:ln w="25400"/>
         </p:spPr>
         <p:style>
           <a:lnRef idx="1">
@@ -6706,6 +7019,7 @@
           <a:prstGeom prst="line">
             <a:avLst/>
           </a:prstGeom>
+          <a:ln w="25400"/>
         </p:spPr>
         <p:style>
           <a:lnRef idx="1">
@@ -6746,6 +7060,7 @@
           <a:prstGeom prst="line">
             <a:avLst/>
           </a:prstGeom>
+          <a:ln w="25400"/>
         </p:spPr>
         <p:style>
           <a:lnRef idx="1">
@@ -6865,7 +7180,18 @@
                   <a:schemeClr val="tx1"/>
                 </a:solidFill>
               </a:rPr>
-              <a:t>UDP Port 80</a:t>
+              <a:t>UDP Port</a:t>
+            </a:r>
+          </a:p>
+          <a:p>
+            <a:pPr algn="ctr"/>
+            <a:r>
+              <a:rPr lang="en-SG" sz="1200" dirty="0">
+                <a:solidFill>
+                  <a:schemeClr val="tx1"/>
+                </a:solidFill>
+              </a:rPr>
+              <a:t>Random</a:t>
             </a:r>
           </a:p>
         </p:txBody>
@@ -7113,60 +7439,6 @@
           </a:p>
         </p:txBody>
       </p:sp>
-      <p:sp>
-        <p:nvSpPr>
-          <p:cNvPr id="49" name="Rectangle 48">
-            <a:extLst>
-              <a:ext uri="{FF2B5EF4-FFF2-40B4-BE49-F238E27FC236}">
-                <a16:creationId xmlns:a16="http://schemas.microsoft.com/office/drawing/2014/main" id="{146A58C9-BE01-4C1D-8CD7-5432B9EDB44B}"/>
-              </a:ext>
-            </a:extLst>
-          </p:cNvPr>
-          <p:cNvSpPr/>
-          <p:nvPr/>
-        </p:nvSpPr>
-        <p:spPr>
-          <a:xfrm>
-            <a:off x="8019912" y="1962302"/>
-            <a:ext cx="888814" cy="223594"/>
-          </a:xfrm>
-          <a:prstGeom prst="rect">
-            <a:avLst/>
-          </a:prstGeom>
-          <a:noFill/>
-        </p:spPr>
-        <p:style>
-          <a:lnRef idx="2">
-            <a:schemeClr val="accent1">
-              <a:shade val="50000"/>
-            </a:schemeClr>
-          </a:lnRef>
-          <a:fillRef idx="1">
-            <a:schemeClr val="accent1"/>
-          </a:fillRef>
-          <a:effectRef idx="0">
-            <a:schemeClr val="accent1"/>
-          </a:effectRef>
-          <a:fontRef idx="minor">
-            <a:schemeClr val="lt1"/>
-          </a:fontRef>
-        </p:style>
-        <p:txBody>
-          <a:bodyPr rtlCol="0" anchor="ctr"/>
-          <a:lstStyle/>
-          <a:p>
-            <a:pPr algn="ctr"/>
-            <a:r>
-              <a:rPr lang="en-SG" sz="1400" dirty="0">
-                <a:solidFill>
-                  <a:schemeClr val="tx1"/>
-                </a:solidFill>
-              </a:rPr>
-              <a:t>Tracker</a:t>
-            </a:r>
-          </a:p>
-        </p:txBody>
-      </p:sp>
       <p:cxnSp>
         <p:nvCxnSpPr>
           <p:cNvPr id="50" name="Straight Connector 49">
@@ -7190,6 +7462,7 @@
           <a:prstGeom prst="line">
             <a:avLst/>
           </a:prstGeom>
+          <a:ln w="25400"/>
         </p:spPr>
         <p:style>
           <a:lnRef idx="1">
@@ -7230,6 +7503,7 @@
           <a:prstGeom prst="line">
             <a:avLst/>
           </a:prstGeom>
+          <a:ln w="25400"/>
         </p:spPr>
         <p:style>
           <a:lnRef idx="1">
@@ -7270,6 +7544,7 @@
           <a:prstGeom prst="line">
             <a:avLst/>
           </a:prstGeom>
+          <a:ln w="25400"/>
         </p:spPr>
         <p:style>
           <a:lnRef idx="1">
@@ -7297,19 +7572,18 @@
           </p:cNvPr>
           <p:cNvCxnSpPr>
             <a:cxnSpLocks/>
+            <a:stCxn id="21" idx="0"/>
             <a:endCxn id="16" idx="1"/>
           </p:cNvCxnSpPr>
           <p:nvPr/>
         </p:nvCxnSpPr>
         <p:spPr>
-          <a:xfrm flipV="1">
-            <a:off x="3530786" y="1057899"/>
-            <a:ext cx="1907783" cy="907714"/>
-          </a:xfrm>
-          <a:prstGeom prst="bentConnector3">
-            <a:avLst>
-              <a:gd name="adj1" fmla="val -5277"/>
-            </a:avLst>
+          <a:xfrm rot="5400000" flipH="1" flipV="1">
+            <a:off x="4048616" y="802597"/>
+            <a:ext cx="1134650" cy="1645255"/>
+          </a:xfrm>
+          <a:prstGeom prst="bentConnector2">
+            <a:avLst/>
           </a:prstGeom>
           <a:ln>
             <a:tailEnd type="triangle"/>
@@ -7376,15 +7650,15 @@
           </p:cNvPr>
           <p:cNvCxnSpPr>
             <a:cxnSpLocks/>
-            <a:stCxn id="49" idx="0"/>
+            <a:stCxn id="44" idx="0"/>
             <a:endCxn id="16" idx="3"/>
           </p:cNvCxnSpPr>
           <p:nvPr/>
         </p:nvCxnSpPr>
         <p:spPr>
           <a:xfrm rot="16200000" flipV="1">
-            <a:off x="6943650" y="441633"/>
-            <a:ext cx="904403" cy="2136936"/>
+            <a:off x="6831296" y="553987"/>
+            <a:ext cx="1129111" cy="2136936"/>
           </a:xfrm>
           <a:prstGeom prst="bentConnector2">
             <a:avLst/>
@@ -7607,6 +7881,7 @@
           <a:prstGeom prst="line">
             <a:avLst/>
           </a:prstGeom>
+          <a:ln w="25400"/>
         </p:spPr>
         <p:style>
           <a:lnRef idx="1">
@@ -7637,7 +7912,7 @@
         </p:nvSpPr>
         <p:spPr>
           <a:xfrm>
-            <a:off x="3028538" y="800282"/>
+            <a:off x="3190389" y="806361"/>
             <a:ext cx="2615272" cy="276999"/>
           </a:xfrm>
           <a:prstGeom prst="rect">

</xml_diff>

<commit_message>
added resend packet from p2p client to tracker
</commit_message>
<xml_diff>
--- a/image/CS3103.pptx
+++ b/image/CS3103.pptx
@@ -108,7 +108,7 @@
   </p:defaultTextStyle>
   <p:extLst>
     <p:ext uri="{EFAFB233-063F-42B5-8137-9DF3F51BA10A}">
-      <p15:sldGuideLst xmlns:p15="http://schemas.microsoft.com/office/powerpoint/2012/main"/>
+      <p15:sldGuideLst xmlns:p15="http://schemas.microsoft.com/office/powerpoint/2012/main" xmlns=""/>
     </p:ext>
   </p:extLst>
 </p:presentation>
@@ -136,7 +136,7 @@
           <p:cNvPr id="2" name="Title 1">
             <a:extLst>
               <a:ext uri="{FF2B5EF4-FFF2-40B4-BE49-F238E27FC236}">
-                <a16:creationId xmlns:a16="http://schemas.microsoft.com/office/drawing/2014/main" id="{8E12FD51-CDD7-46AF-9A8B-EFE62867940D}"/>
+                <a16:creationId xmlns:a16="http://schemas.microsoft.com/office/drawing/2014/main" xmlns="" id="{8E12FD51-CDD7-46AF-9A8B-EFE62867940D}"/>
               </a:ext>
             </a:extLst>
           </p:cNvPr>
@@ -174,7 +174,7 @@
           <p:cNvPr id="3" name="Subtitle 2">
             <a:extLst>
               <a:ext uri="{FF2B5EF4-FFF2-40B4-BE49-F238E27FC236}">
-                <a16:creationId xmlns:a16="http://schemas.microsoft.com/office/drawing/2014/main" id="{23F3393B-4888-4CAF-B4A7-BABE586AD5B5}"/>
+                <a16:creationId xmlns:a16="http://schemas.microsoft.com/office/drawing/2014/main" xmlns="" id="{23F3393B-4888-4CAF-B4A7-BABE586AD5B5}"/>
               </a:ext>
             </a:extLst>
           </p:cNvPr>
@@ -245,7 +245,7 @@
           <p:cNvPr id="4" name="Date Placeholder 3">
             <a:extLst>
               <a:ext uri="{FF2B5EF4-FFF2-40B4-BE49-F238E27FC236}">
-                <a16:creationId xmlns:a16="http://schemas.microsoft.com/office/drawing/2014/main" id="{B10E77CA-6CCB-4A4A-9478-4667A12F0064}"/>
+                <a16:creationId xmlns:a16="http://schemas.microsoft.com/office/drawing/2014/main" xmlns="" id="{B10E77CA-6CCB-4A4A-9478-4667A12F0064}"/>
               </a:ext>
             </a:extLst>
           </p:cNvPr>
@@ -263,7 +263,7 @@
           <a:p>
             <a:fld id="{CBC8E649-B73B-4477-B0E0-354D57AB8D4C}" type="datetimeFigureOut">
               <a:rPr lang="en-SG" smtClean="0"/>
-              <a:t>17/10/2018</a:t>
+              <a:t>15/11/2018</a:t>
             </a:fld>
             <a:endParaRPr lang="en-SG"/>
           </a:p>
@@ -274,7 +274,7 @@
           <p:cNvPr id="5" name="Footer Placeholder 4">
             <a:extLst>
               <a:ext uri="{FF2B5EF4-FFF2-40B4-BE49-F238E27FC236}">
-                <a16:creationId xmlns:a16="http://schemas.microsoft.com/office/drawing/2014/main" id="{A2EDEFAF-6C34-4EBD-A296-B5BEEAF47FC5}"/>
+                <a16:creationId xmlns:a16="http://schemas.microsoft.com/office/drawing/2014/main" xmlns="" id="{A2EDEFAF-6C34-4EBD-A296-B5BEEAF47FC5}"/>
               </a:ext>
             </a:extLst>
           </p:cNvPr>
@@ -299,7 +299,7 @@
           <p:cNvPr id="6" name="Slide Number Placeholder 5">
             <a:extLst>
               <a:ext uri="{FF2B5EF4-FFF2-40B4-BE49-F238E27FC236}">
-                <a16:creationId xmlns:a16="http://schemas.microsoft.com/office/drawing/2014/main" id="{85AABD9F-2C59-457F-833D-ACC02F31D620}"/>
+                <a16:creationId xmlns:a16="http://schemas.microsoft.com/office/drawing/2014/main" xmlns="" id="{85AABD9F-2C59-457F-833D-ACC02F31D620}"/>
               </a:ext>
             </a:extLst>
           </p:cNvPr>
@@ -358,7 +358,7 @@
           <p:cNvPr id="2" name="Title 1">
             <a:extLst>
               <a:ext uri="{FF2B5EF4-FFF2-40B4-BE49-F238E27FC236}">
-                <a16:creationId xmlns:a16="http://schemas.microsoft.com/office/drawing/2014/main" id="{2BF13541-1D84-4CCA-9F44-21FDD5126A88}"/>
+                <a16:creationId xmlns:a16="http://schemas.microsoft.com/office/drawing/2014/main" xmlns="" id="{2BF13541-1D84-4CCA-9F44-21FDD5126A88}"/>
               </a:ext>
             </a:extLst>
           </p:cNvPr>
@@ -387,7 +387,7 @@
           <p:cNvPr id="3" name="Vertical Text Placeholder 2">
             <a:extLst>
               <a:ext uri="{FF2B5EF4-FFF2-40B4-BE49-F238E27FC236}">
-                <a16:creationId xmlns:a16="http://schemas.microsoft.com/office/drawing/2014/main" id="{20183E8B-2915-43ED-B4D9-049C29342153}"/>
+                <a16:creationId xmlns:a16="http://schemas.microsoft.com/office/drawing/2014/main" xmlns="" id="{20183E8B-2915-43ED-B4D9-049C29342153}"/>
               </a:ext>
             </a:extLst>
           </p:cNvPr>
@@ -445,7 +445,7 @@
           <p:cNvPr id="4" name="Date Placeholder 3">
             <a:extLst>
               <a:ext uri="{FF2B5EF4-FFF2-40B4-BE49-F238E27FC236}">
-                <a16:creationId xmlns:a16="http://schemas.microsoft.com/office/drawing/2014/main" id="{5B5F023F-03D8-442A-805B-0148D5E7EECC}"/>
+                <a16:creationId xmlns:a16="http://schemas.microsoft.com/office/drawing/2014/main" xmlns="" id="{5B5F023F-03D8-442A-805B-0148D5E7EECC}"/>
               </a:ext>
             </a:extLst>
           </p:cNvPr>
@@ -463,7 +463,7 @@
           <a:p>
             <a:fld id="{CBC8E649-B73B-4477-B0E0-354D57AB8D4C}" type="datetimeFigureOut">
               <a:rPr lang="en-SG" smtClean="0"/>
-              <a:t>17/10/2018</a:t>
+              <a:t>15/11/2018</a:t>
             </a:fld>
             <a:endParaRPr lang="en-SG"/>
           </a:p>
@@ -474,7 +474,7 @@
           <p:cNvPr id="5" name="Footer Placeholder 4">
             <a:extLst>
               <a:ext uri="{FF2B5EF4-FFF2-40B4-BE49-F238E27FC236}">
-                <a16:creationId xmlns:a16="http://schemas.microsoft.com/office/drawing/2014/main" id="{1D2914A6-0011-4ED9-AFAA-53EAAA8E86EF}"/>
+                <a16:creationId xmlns:a16="http://schemas.microsoft.com/office/drawing/2014/main" xmlns="" id="{1D2914A6-0011-4ED9-AFAA-53EAAA8E86EF}"/>
               </a:ext>
             </a:extLst>
           </p:cNvPr>
@@ -499,7 +499,7 @@
           <p:cNvPr id="6" name="Slide Number Placeholder 5">
             <a:extLst>
               <a:ext uri="{FF2B5EF4-FFF2-40B4-BE49-F238E27FC236}">
-                <a16:creationId xmlns:a16="http://schemas.microsoft.com/office/drawing/2014/main" id="{4F375475-D20F-4E10-96E5-5FCBFB5E31EB}"/>
+                <a16:creationId xmlns:a16="http://schemas.microsoft.com/office/drawing/2014/main" xmlns="" id="{4F375475-D20F-4E10-96E5-5FCBFB5E31EB}"/>
               </a:ext>
             </a:extLst>
           </p:cNvPr>
@@ -558,7 +558,7 @@
           <p:cNvPr id="2" name="Vertical Title 1">
             <a:extLst>
               <a:ext uri="{FF2B5EF4-FFF2-40B4-BE49-F238E27FC236}">
-                <a16:creationId xmlns:a16="http://schemas.microsoft.com/office/drawing/2014/main" id="{5347730B-23AC-4376-8D5B-58229D92072F}"/>
+                <a16:creationId xmlns:a16="http://schemas.microsoft.com/office/drawing/2014/main" xmlns="" id="{5347730B-23AC-4376-8D5B-58229D92072F}"/>
               </a:ext>
             </a:extLst>
           </p:cNvPr>
@@ -592,7 +592,7 @@
           <p:cNvPr id="3" name="Vertical Text Placeholder 2">
             <a:extLst>
               <a:ext uri="{FF2B5EF4-FFF2-40B4-BE49-F238E27FC236}">
-                <a16:creationId xmlns:a16="http://schemas.microsoft.com/office/drawing/2014/main" id="{CCF868A1-98BF-42E1-BC7E-14F49085C022}"/>
+                <a16:creationId xmlns:a16="http://schemas.microsoft.com/office/drawing/2014/main" xmlns="" id="{CCF868A1-98BF-42E1-BC7E-14F49085C022}"/>
               </a:ext>
             </a:extLst>
           </p:cNvPr>
@@ -655,7 +655,7 @@
           <p:cNvPr id="4" name="Date Placeholder 3">
             <a:extLst>
               <a:ext uri="{FF2B5EF4-FFF2-40B4-BE49-F238E27FC236}">
-                <a16:creationId xmlns:a16="http://schemas.microsoft.com/office/drawing/2014/main" id="{FFE0BEBC-9FE6-4DFA-8453-BC5513DC6301}"/>
+                <a16:creationId xmlns:a16="http://schemas.microsoft.com/office/drawing/2014/main" xmlns="" id="{FFE0BEBC-9FE6-4DFA-8453-BC5513DC6301}"/>
               </a:ext>
             </a:extLst>
           </p:cNvPr>
@@ -673,7 +673,7 @@
           <a:p>
             <a:fld id="{CBC8E649-B73B-4477-B0E0-354D57AB8D4C}" type="datetimeFigureOut">
               <a:rPr lang="en-SG" smtClean="0"/>
-              <a:t>17/10/2018</a:t>
+              <a:t>15/11/2018</a:t>
             </a:fld>
             <a:endParaRPr lang="en-SG"/>
           </a:p>
@@ -684,7 +684,7 @@
           <p:cNvPr id="5" name="Footer Placeholder 4">
             <a:extLst>
               <a:ext uri="{FF2B5EF4-FFF2-40B4-BE49-F238E27FC236}">
-                <a16:creationId xmlns:a16="http://schemas.microsoft.com/office/drawing/2014/main" id="{7A999CCA-75EC-4DD4-9274-521B66CB31E8}"/>
+                <a16:creationId xmlns:a16="http://schemas.microsoft.com/office/drawing/2014/main" xmlns="" id="{7A999CCA-75EC-4DD4-9274-521B66CB31E8}"/>
               </a:ext>
             </a:extLst>
           </p:cNvPr>
@@ -709,7 +709,7 @@
           <p:cNvPr id="6" name="Slide Number Placeholder 5">
             <a:extLst>
               <a:ext uri="{FF2B5EF4-FFF2-40B4-BE49-F238E27FC236}">
-                <a16:creationId xmlns:a16="http://schemas.microsoft.com/office/drawing/2014/main" id="{781878D8-62A1-40DC-8C55-450DCE71D97E}"/>
+                <a16:creationId xmlns:a16="http://schemas.microsoft.com/office/drawing/2014/main" xmlns="" id="{781878D8-62A1-40DC-8C55-450DCE71D97E}"/>
               </a:ext>
             </a:extLst>
           </p:cNvPr>
@@ -768,7 +768,7 @@
           <p:cNvPr id="2" name="Title 1">
             <a:extLst>
               <a:ext uri="{FF2B5EF4-FFF2-40B4-BE49-F238E27FC236}">
-                <a16:creationId xmlns:a16="http://schemas.microsoft.com/office/drawing/2014/main" id="{299893B5-CC6E-48B9-86D5-3976D63625D5}"/>
+                <a16:creationId xmlns:a16="http://schemas.microsoft.com/office/drawing/2014/main" xmlns="" id="{299893B5-CC6E-48B9-86D5-3976D63625D5}"/>
               </a:ext>
             </a:extLst>
           </p:cNvPr>
@@ -797,7 +797,7 @@
           <p:cNvPr id="3" name="Content Placeholder 2">
             <a:extLst>
               <a:ext uri="{FF2B5EF4-FFF2-40B4-BE49-F238E27FC236}">
-                <a16:creationId xmlns:a16="http://schemas.microsoft.com/office/drawing/2014/main" id="{0E1C2300-EEFF-4DE3-A298-2F6E17D4B7A2}"/>
+                <a16:creationId xmlns:a16="http://schemas.microsoft.com/office/drawing/2014/main" xmlns="" id="{0E1C2300-EEFF-4DE3-A298-2F6E17D4B7A2}"/>
               </a:ext>
             </a:extLst>
           </p:cNvPr>
@@ -855,7 +855,7 @@
           <p:cNvPr id="4" name="Date Placeholder 3">
             <a:extLst>
               <a:ext uri="{FF2B5EF4-FFF2-40B4-BE49-F238E27FC236}">
-                <a16:creationId xmlns:a16="http://schemas.microsoft.com/office/drawing/2014/main" id="{740EC7DD-1B5D-494A-85B3-664049FB124A}"/>
+                <a16:creationId xmlns:a16="http://schemas.microsoft.com/office/drawing/2014/main" xmlns="" id="{740EC7DD-1B5D-494A-85B3-664049FB124A}"/>
               </a:ext>
             </a:extLst>
           </p:cNvPr>
@@ -873,7 +873,7 @@
           <a:p>
             <a:fld id="{CBC8E649-B73B-4477-B0E0-354D57AB8D4C}" type="datetimeFigureOut">
               <a:rPr lang="en-SG" smtClean="0"/>
-              <a:t>17/10/2018</a:t>
+              <a:t>15/11/2018</a:t>
             </a:fld>
             <a:endParaRPr lang="en-SG"/>
           </a:p>
@@ -884,7 +884,7 @@
           <p:cNvPr id="5" name="Footer Placeholder 4">
             <a:extLst>
               <a:ext uri="{FF2B5EF4-FFF2-40B4-BE49-F238E27FC236}">
-                <a16:creationId xmlns:a16="http://schemas.microsoft.com/office/drawing/2014/main" id="{C9604FED-3EBB-4F5B-9807-038468442322}"/>
+                <a16:creationId xmlns:a16="http://schemas.microsoft.com/office/drawing/2014/main" xmlns="" id="{C9604FED-3EBB-4F5B-9807-038468442322}"/>
               </a:ext>
             </a:extLst>
           </p:cNvPr>
@@ -909,7 +909,7 @@
           <p:cNvPr id="6" name="Slide Number Placeholder 5">
             <a:extLst>
               <a:ext uri="{FF2B5EF4-FFF2-40B4-BE49-F238E27FC236}">
-                <a16:creationId xmlns:a16="http://schemas.microsoft.com/office/drawing/2014/main" id="{347C14F8-21F6-4724-A631-CE23E8C9873A}"/>
+                <a16:creationId xmlns:a16="http://schemas.microsoft.com/office/drawing/2014/main" xmlns="" id="{347C14F8-21F6-4724-A631-CE23E8C9873A}"/>
               </a:ext>
             </a:extLst>
           </p:cNvPr>
@@ -968,7 +968,7 @@
           <p:cNvPr id="2" name="Title 1">
             <a:extLst>
               <a:ext uri="{FF2B5EF4-FFF2-40B4-BE49-F238E27FC236}">
-                <a16:creationId xmlns:a16="http://schemas.microsoft.com/office/drawing/2014/main" id="{E9753ECD-9260-4A8F-878A-C246B1594557}"/>
+                <a16:creationId xmlns:a16="http://schemas.microsoft.com/office/drawing/2014/main" xmlns="" id="{E9753ECD-9260-4A8F-878A-C246B1594557}"/>
               </a:ext>
             </a:extLst>
           </p:cNvPr>
@@ -1006,7 +1006,7 @@
           <p:cNvPr id="3" name="Text Placeholder 2">
             <a:extLst>
               <a:ext uri="{FF2B5EF4-FFF2-40B4-BE49-F238E27FC236}">
-                <a16:creationId xmlns:a16="http://schemas.microsoft.com/office/drawing/2014/main" id="{88E9AF6E-2EDF-4055-80AD-6EC0D05FE959}"/>
+                <a16:creationId xmlns:a16="http://schemas.microsoft.com/office/drawing/2014/main" xmlns="" id="{88E9AF6E-2EDF-4055-80AD-6EC0D05FE959}"/>
               </a:ext>
             </a:extLst>
           </p:cNvPr>
@@ -1131,7 +1131,7 @@
           <p:cNvPr id="4" name="Date Placeholder 3">
             <a:extLst>
               <a:ext uri="{FF2B5EF4-FFF2-40B4-BE49-F238E27FC236}">
-                <a16:creationId xmlns:a16="http://schemas.microsoft.com/office/drawing/2014/main" id="{E23C465A-86CA-41F9-B10F-AF098B9AA5AC}"/>
+                <a16:creationId xmlns:a16="http://schemas.microsoft.com/office/drawing/2014/main" xmlns="" id="{E23C465A-86CA-41F9-B10F-AF098B9AA5AC}"/>
               </a:ext>
             </a:extLst>
           </p:cNvPr>
@@ -1149,7 +1149,7 @@
           <a:p>
             <a:fld id="{CBC8E649-B73B-4477-B0E0-354D57AB8D4C}" type="datetimeFigureOut">
               <a:rPr lang="en-SG" smtClean="0"/>
-              <a:t>17/10/2018</a:t>
+              <a:t>15/11/2018</a:t>
             </a:fld>
             <a:endParaRPr lang="en-SG"/>
           </a:p>
@@ -1160,7 +1160,7 @@
           <p:cNvPr id="5" name="Footer Placeholder 4">
             <a:extLst>
               <a:ext uri="{FF2B5EF4-FFF2-40B4-BE49-F238E27FC236}">
-                <a16:creationId xmlns:a16="http://schemas.microsoft.com/office/drawing/2014/main" id="{C3A6A955-5F8B-4C0D-B381-F9A9DFA8CC1E}"/>
+                <a16:creationId xmlns:a16="http://schemas.microsoft.com/office/drawing/2014/main" xmlns="" id="{C3A6A955-5F8B-4C0D-B381-F9A9DFA8CC1E}"/>
               </a:ext>
             </a:extLst>
           </p:cNvPr>
@@ -1185,7 +1185,7 @@
           <p:cNvPr id="6" name="Slide Number Placeholder 5">
             <a:extLst>
               <a:ext uri="{FF2B5EF4-FFF2-40B4-BE49-F238E27FC236}">
-                <a16:creationId xmlns:a16="http://schemas.microsoft.com/office/drawing/2014/main" id="{D596EF50-6AAC-4195-A454-ED113D81B95B}"/>
+                <a16:creationId xmlns:a16="http://schemas.microsoft.com/office/drawing/2014/main" xmlns="" id="{D596EF50-6AAC-4195-A454-ED113D81B95B}"/>
               </a:ext>
             </a:extLst>
           </p:cNvPr>
@@ -1244,7 +1244,7 @@
           <p:cNvPr id="2" name="Title 1">
             <a:extLst>
               <a:ext uri="{FF2B5EF4-FFF2-40B4-BE49-F238E27FC236}">
-                <a16:creationId xmlns:a16="http://schemas.microsoft.com/office/drawing/2014/main" id="{B666188C-B707-454A-9441-9C92E577FA9D}"/>
+                <a16:creationId xmlns:a16="http://schemas.microsoft.com/office/drawing/2014/main" xmlns="" id="{B666188C-B707-454A-9441-9C92E577FA9D}"/>
               </a:ext>
             </a:extLst>
           </p:cNvPr>
@@ -1273,7 +1273,7 @@
           <p:cNvPr id="3" name="Content Placeholder 2">
             <a:extLst>
               <a:ext uri="{FF2B5EF4-FFF2-40B4-BE49-F238E27FC236}">
-                <a16:creationId xmlns:a16="http://schemas.microsoft.com/office/drawing/2014/main" id="{7ABAE887-6DFA-49F5-88E7-935122F41F09}"/>
+                <a16:creationId xmlns:a16="http://schemas.microsoft.com/office/drawing/2014/main" xmlns="" id="{7ABAE887-6DFA-49F5-88E7-935122F41F09}"/>
               </a:ext>
             </a:extLst>
           </p:cNvPr>
@@ -1336,7 +1336,7 @@
           <p:cNvPr id="4" name="Content Placeholder 3">
             <a:extLst>
               <a:ext uri="{FF2B5EF4-FFF2-40B4-BE49-F238E27FC236}">
-                <a16:creationId xmlns:a16="http://schemas.microsoft.com/office/drawing/2014/main" id="{8B85FB5A-1EFE-4AAA-8C0C-A434880445D5}"/>
+                <a16:creationId xmlns:a16="http://schemas.microsoft.com/office/drawing/2014/main" xmlns="" id="{8B85FB5A-1EFE-4AAA-8C0C-A434880445D5}"/>
               </a:ext>
             </a:extLst>
           </p:cNvPr>
@@ -1399,7 +1399,7 @@
           <p:cNvPr id="5" name="Date Placeholder 4">
             <a:extLst>
               <a:ext uri="{FF2B5EF4-FFF2-40B4-BE49-F238E27FC236}">
-                <a16:creationId xmlns:a16="http://schemas.microsoft.com/office/drawing/2014/main" id="{B4BFEEBA-A2DF-4BA9-B35F-D4D85DCBB3AA}"/>
+                <a16:creationId xmlns:a16="http://schemas.microsoft.com/office/drawing/2014/main" xmlns="" id="{B4BFEEBA-A2DF-4BA9-B35F-D4D85DCBB3AA}"/>
               </a:ext>
             </a:extLst>
           </p:cNvPr>
@@ -1417,7 +1417,7 @@
           <a:p>
             <a:fld id="{CBC8E649-B73B-4477-B0E0-354D57AB8D4C}" type="datetimeFigureOut">
               <a:rPr lang="en-SG" smtClean="0"/>
-              <a:t>17/10/2018</a:t>
+              <a:t>15/11/2018</a:t>
             </a:fld>
             <a:endParaRPr lang="en-SG"/>
           </a:p>
@@ -1428,7 +1428,7 @@
           <p:cNvPr id="6" name="Footer Placeholder 5">
             <a:extLst>
               <a:ext uri="{FF2B5EF4-FFF2-40B4-BE49-F238E27FC236}">
-                <a16:creationId xmlns:a16="http://schemas.microsoft.com/office/drawing/2014/main" id="{746E880C-3841-43F0-BBE8-61815FE0E08F}"/>
+                <a16:creationId xmlns:a16="http://schemas.microsoft.com/office/drawing/2014/main" xmlns="" id="{746E880C-3841-43F0-BBE8-61815FE0E08F}"/>
               </a:ext>
             </a:extLst>
           </p:cNvPr>
@@ -1453,7 +1453,7 @@
           <p:cNvPr id="7" name="Slide Number Placeholder 6">
             <a:extLst>
               <a:ext uri="{FF2B5EF4-FFF2-40B4-BE49-F238E27FC236}">
-                <a16:creationId xmlns:a16="http://schemas.microsoft.com/office/drawing/2014/main" id="{960C3790-AEAF-477C-970D-22B8F43F63FF}"/>
+                <a16:creationId xmlns:a16="http://schemas.microsoft.com/office/drawing/2014/main" xmlns="" id="{960C3790-AEAF-477C-970D-22B8F43F63FF}"/>
               </a:ext>
             </a:extLst>
           </p:cNvPr>
@@ -1512,7 +1512,7 @@
           <p:cNvPr id="2" name="Title 1">
             <a:extLst>
               <a:ext uri="{FF2B5EF4-FFF2-40B4-BE49-F238E27FC236}">
-                <a16:creationId xmlns:a16="http://schemas.microsoft.com/office/drawing/2014/main" id="{45CDC01F-FFA0-44EF-A647-1D600B675697}"/>
+                <a16:creationId xmlns:a16="http://schemas.microsoft.com/office/drawing/2014/main" xmlns="" id="{45CDC01F-FFA0-44EF-A647-1D600B675697}"/>
               </a:ext>
             </a:extLst>
           </p:cNvPr>
@@ -1546,7 +1546,7 @@
           <p:cNvPr id="3" name="Text Placeholder 2">
             <a:extLst>
               <a:ext uri="{FF2B5EF4-FFF2-40B4-BE49-F238E27FC236}">
-                <a16:creationId xmlns:a16="http://schemas.microsoft.com/office/drawing/2014/main" id="{2F2D7772-18B0-490C-BE2E-E9E0A1F89DB3}"/>
+                <a16:creationId xmlns:a16="http://schemas.microsoft.com/office/drawing/2014/main" xmlns="" id="{2F2D7772-18B0-490C-BE2E-E9E0A1F89DB3}"/>
               </a:ext>
             </a:extLst>
           </p:cNvPr>
@@ -1617,7 +1617,7 @@
           <p:cNvPr id="4" name="Content Placeholder 3">
             <a:extLst>
               <a:ext uri="{FF2B5EF4-FFF2-40B4-BE49-F238E27FC236}">
-                <a16:creationId xmlns:a16="http://schemas.microsoft.com/office/drawing/2014/main" id="{55C8C8C5-FD3F-4846-B4A8-0A28A5DE730F}"/>
+                <a16:creationId xmlns:a16="http://schemas.microsoft.com/office/drawing/2014/main" xmlns="" id="{55C8C8C5-FD3F-4846-B4A8-0A28A5DE730F}"/>
               </a:ext>
             </a:extLst>
           </p:cNvPr>
@@ -1680,7 +1680,7 @@
           <p:cNvPr id="5" name="Text Placeholder 4">
             <a:extLst>
               <a:ext uri="{FF2B5EF4-FFF2-40B4-BE49-F238E27FC236}">
-                <a16:creationId xmlns:a16="http://schemas.microsoft.com/office/drawing/2014/main" id="{11077302-8B5A-41C3-92D1-95B48F37938B}"/>
+                <a16:creationId xmlns:a16="http://schemas.microsoft.com/office/drawing/2014/main" xmlns="" id="{11077302-8B5A-41C3-92D1-95B48F37938B}"/>
               </a:ext>
             </a:extLst>
           </p:cNvPr>
@@ -1751,7 +1751,7 @@
           <p:cNvPr id="6" name="Content Placeholder 5">
             <a:extLst>
               <a:ext uri="{FF2B5EF4-FFF2-40B4-BE49-F238E27FC236}">
-                <a16:creationId xmlns:a16="http://schemas.microsoft.com/office/drawing/2014/main" id="{2DCE2C4D-6511-4D02-8A34-8A93B4492D7D}"/>
+                <a16:creationId xmlns:a16="http://schemas.microsoft.com/office/drawing/2014/main" xmlns="" id="{2DCE2C4D-6511-4D02-8A34-8A93B4492D7D}"/>
               </a:ext>
             </a:extLst>
           </p:cNvPr>
@@ -1814,7 +1814,7 @@
           <p:cNvPr id="7" name="Date Placeholder 6">
             <a:extLst>
               <a:ext uri="{FF2B5EF4-FFF2-40B4-BE49-F238E27FC236}">
-                <a16:creationId xmlns:a16="http://schemas.microsoft.com/office/drawing/2014/main" id="{48AF8070-A828-4FAC-B3F1-57DC498DE652}"/>
+                <a16:creationId xmlns:a16="http://schemas.microsoft.com/office/drawing/2014/main" xmlns="" id="{48AF8070-A828-4FAC-B3F1-57DC498DE652}"/>
               </a:ext>
             </a:extLst>
           </p:cNvPr>
@@ -1832,7 +1832,7 @@
           <a:p>
             <a:fld id="{CBC8E649-B73B-4477-B0E0-354D57AB8D4C}" type="datetimeFigureOut">
               <a:rPr lang="en-SG" smtClean="0"/>
-              <a:t>17/10/2018</a:t>
+              <a:t>15/11/2018</a:t>
             </a:fld>
             <a:endParaRPr lang="en-SG"/>
           </a:p>
@@ -1843,7 +1843,7 @@
           <p:cNvPr id="8" name="Footer Placeholder 7">
             <a:extLst>
               <a:ext uri="{FF2B5EF4-FFF2-40B4-BE49-F238E27FC236}">
-                <a16:creationId xmlns:a16="http://schemas.microsoft.com/office/drawing/2014/main" id="{32DAA1A3-0AD4-4BD4-8218-D5517EDFFCAE}"/>
+                <a16:creationId xmlns:a16="http://schemas.microsoft.com/office/drawing/2014/main" xmlns="" id="{32DAA1A3-0AD4-4BD4-8218-D5517EDFFCAE}"/>
               </a:ext>
             </a:extLst>
           </p:cNvPr>
@@ -1868,7 +1868,7 @@
           <p:cNvPr id="9" name="Slide Number Placeholder 8">
             <a:extLst>
               <a:ext uri="{FF2B5EF4-FFF2-40B4-BE49-F238E27FC236}">
-                <a16:creationId xmlns:a16="http://schemas.microsoft.com/office/drawing/2014/main" id="{EEEE58F5-BF06-4FE6-9D32-283E849AA1DF}"/>
+                <a16:creationId xmlns:a16="http://schemas.microsoft.com/office/drawing/2014/main" xmlns="" id="{EEEE58F5-BF06-4FE6-9D32-283E849AA1DF}"/>
               </a:ext>
             </a:extLst>
           </p:cNvPr>
@@ -1927,7 +1927,7 @@
           <p:cNvPr id="2" name="Title 1">
             <a:extLst>
               <a:ext uri="{FF2B5EF4-FFF2-40B4-BE49-F238E27FC236}">
-                <a16:creationId xmlns:a16="http://schemas.microsoft.com/office/drawing/2014/main" id="{C2010F50-AFB6-4BD7-A1B5-DB24E6CD9E08}"/>
+                <a16:creationId xmlns:a16="http://schemas.microsoft.com/office/drawing/2014/main" xmlns="" id="{C2010F50-AFB6-4BD7-A1B5-DB24E6CD9E08}"/>
               </a:ext>
             </a:extLst>
           </p:cNvPr>
@@ -1956,7 +1956,7 @@
           <p:cNvPr id="3" name="Date Placeholder 2">
             <a:extLst>
               <a:ext uri="{FF2B5EF4-FFF2-40B4-BE49-F238E27FC236}">
-                <a16:creationId xmlns:a16="http://schemas.microsoft.com/office/drawing/2014/main" id="{D01BD328-93D6-4A8C-B27E-F76A3EE0CEAC}"/>
+                <a16:creationId xmlns:a16="http://schemas.microsoft.com/office/drawing/2014/main" xmlns="" id="{D01BD328-93D6-4A8C-B27E-F76A3EE0CEAC}"/>
               </a:ext>
             </a:extLst>
           </p:cNvPr>
@@ -1974,7 +1974,7 @@
           <a:p>
             <a:fld id="{CBC8E649-B73B-4477-B0E0-354D57AB8D4C}" type="datetimeFigureOut">
               <a:rPr lang="en-SG" smtClean="0"/>
-              <a:t>17/10/2018</a:t>
+              <a:t>15/11/2018</a:t>
             </a:fld>
             <a:endParaRPr lang="en-SG"/>
           </a:p>
@@ -1985,7 +1985,7 @@
           <p:cNvPr id="4" name="Footer Placeholder 3">
             <a:extLst>
               <a:ext uri="{FF2B5EF4-FFF2-40B4-BE49-F238E27FC236}">
-                <a16:creationId xmlns:a16="http://schemas.microsoft.com/office/drawing/2014/main" id="{DCA620E0-EAFE-4D13-94A8-18A3BA6127E4}"/>
+                <a16:creationId xmlns:a16="http://schemas.microsoft.com/office/drawing/2014/main" xmlns="" id="{DCA620E0-EAFE-4D13-94A8-18A3BA6127E4}"/>
               </a:ext>
             </a:extLst>
           </p:cNvPr>
@@ -2010,7 +2010,7 @@
           <p:cNvPr id="5" name="Slide Number Placeholder 4">
             <a:extLst>
               <a:ext uri="{FF2B5EF4-FFF2-40B4-BE49-F238E27FC236}">
-                <a16:creationId xmlns:a16="http://schemas.microsoft.com/office/drawing/2014/main" id="{FC13D7B4-2BA3-4A35-8862-6D2CF081C388}"/>
+                <a16:creationId xmlns:a16="http://schemas.microsoft.com/office/drawing/2014/main" xmlns="" id="{FC13D7B4-2BA3-4A35-8862-6D2CF081C388}"/>
               </a:ext>
             </a:extLst>
           </p:cNvPr>
@@ -2069,7 +2069,7 @@
           <p:cNvPr id="2" name="Date Placeholder 1">
             <a:extLst>
               <a:ext uri="{FF2B5EF4-FFF2-40B4-BE49-F238E27FC236}">
-                <a16:creationId xmlns:a16="http://schemas.microsoft.com/office/drawing/2014/main" id="{B0DD8C5F-B45B-4BF4-B8D7-DD2492B0D262}"/>
+                <a16:creationId xmlns:a16="http://schemas.microsoft.com/office/drawing/2014/main" xmlns="" id="{B0DD8C5F-B45B-4BF4-B8D7-DD2492B0D262}"/>
               </a:ext>
             </a:extLst>
           </p:cNvPr>
@@ -2087,7 +2087,7 @@
           <a:p>
             <a:fld id="{CBC8E649-B73B-4477-B0E0-354D57AB8D4C}" type="datetimeFigureOut">
               <a:rPr lang="en-SG" smtClean="0"/>
-              <a:t>17/10/2018</a:t>
+              <a:t>15/11/2018</a:t>
             </a:fld>
             <a:endParaRPr lang="en-SG"/>
           </a:p>
@@ -2098,7 +2098,7 @@
           <p:cNvPr id="3" name="Footer Placeholder 2">
             <a:extLst>
               <a:ext uri="{FF2B5EF4-FFF2-40B4-BE49-F238E27FC236}">
-                <a16:creationId xmlns:a16="http://schemas.microsoft.com/office/drawing/2014/main" id="{E0626830-208E-4998-81F0-E7681F56C82C}"/>
+                <a16:creationId xmlns:a16="http://schemas.microsoft.com/office/drawing/2014/main" xmlns="" id="{E0626830-208E-4998-81F0-E7681F56C82C}"/>
               </a:ext>
             </a:extLst>
           </p:cNvPr>
@@ -2123,7 +2123,7 @@
           <p:cNvPr id="4" name="Slide Number Placeholder 3">
             <a:extLst>
               <a:ext uri="{FF2B5EF4-FFF2-40B4-BE49-F238E27FC236}">
-                <a16:creationId xmlns:a16="http://schemas.microsoft.com/office/drawing/2014/main" id="{F2D26620-0A53-410B-84C9-A59DBC6C95BF}"/>
+                <a16:creationId xmlns:a16="http://schemas.microsoft.com/office/drawing/2014/main" xmlns="" id="{F2D26620-0A53-410B-84C9-A59DBC6C95BF}"/>
               </a:ext>
             </a:extLst>
           </p:cNvPr>
@@ -2182,7 +2182,7 @@
           <p:cNvPr id="2" name="Title 1">
             <a:extLst>
               <a:ext uri="{FF2B5EF4-FFF2-40B4-BE49-F238E27FC236}">
-                <a16:creationId xmlns:a16="http://schemas.microsoft.com/office/drawing/2014/main" id="{F115C9FF-459D-4C42-B5D8-E1E60DB96ECF}"/>
+                <a16:creationId xmlns:a16="http://schemas.microsoft.com/office/drawing/2014/main" xmlns="" id="{F115C9FF-459D-4C42-B5D8-E1E60DB96ECF}"/>
               </a:ext>
             </a:extLst>
           </p:cNvPr>
@@ -2220,7 +2220,7 @@
           <p:cNvPr id="3" name="Content Placeholder 2">
             <a:extLst>
               <a:ext uri="{FF2B5EF4-FFF2-40B4-BE49-F238E27FC236}">
-                <a16:creationId xmlns:a16="http://schemas.microsoft.com/office/drawing/2014/main" id="{E2E355C4-C34A-4619-8265-3D4534F9175C}"/>
+                <a16:creationId xmlns:a16="http://schemas.microsoft.com/office/drawing/2014/main" xmlns="" id="{E2E355C4-C34A-4619-8265-3D4534F9175C}"/>
               </a:ext>
             </a:extLst>
           </p:cNvPr>
@@ -2311,7 +2311,7 @@
           <p:cNvPr id="4" name="Text Placeholder 3">
             <a:extLst>
               <a:ext uri="{FF2B5EF4-FFF2-40B4-BE49-F238E27FC236}">
-                <a16:creationId xmlns:a16="http://schemas.microsoft.com/office/drawing/2014/main" id="{82C22982-AD9D-4155-8374-A0AD4EFB4A3B}"/>
+                <a16:creationId xmlns:a16="http://schemas.microsoft.com/office/drawing/2014/main" xmlns="" id="{82C22982-AD9D-4155-8374-A0AD4EFB4A3B}"/>
               </a:ext>
             </a:extLst>
           </p:cNvPr>
@@ -2382,7 +2382,7 @@
           <p:cNvPr id="5" name="Date Placeholder 4">
             <a:extLst>
               <a:ext uri="{FF2B5EF4-FFF2-40B4-BE49-F238E27FC236}">
-                <a16:creationId xmlns:a16="http://schemas.microsoft.com/office/drawing/2014/main" id="{1BB7DCE8-EA39-4C40-9B38-F0EFF99E70C5}"/>
+                <a16:creationId xmlns:a16="http://schemas.microsoft.com/office/drawing/2014/main" xmlns="" id="{1BB7DCE8-EA39-4C40-9B38-F0EFF99E70C5}"/>
               </a:ext>
             </a:extLst>
           </p:cNvPr>
@@ -2400,7 +2400,7 @@
           <a:p>
             <a:fld id="{CBC8E649-B73B-4477-B0E0-354D57AB8D4C}" type="datetimeFigureOut">
               <a:rPr lang="en-SG" smtClean="0"/>
-              <a:t>17/10/2018</a:t>
+              <a:t>15/11/2018</a:t>
             </a:fld>
             <a:endParaRPr lang="en-SG"/>
           </a:p>
@@ -2411,7 +2411,7 @@
           <p:cNvPr id="6" name="Footer Placeholder 5">
             <a:extLst>
               <a:ext uri="{FF2B5EF4-FFF2-40B4-BE49-F238E27FC236}">
-                <a16:creationId xmlns:a16="http://schemas.microsoft.com/office/drawing/2014/main" id="{BEA0097E-3BD3-487A-B8A7-258CC9370B97}"/>
+                <a16:creationId xmlns:a16="http://schemas.microsoft.com/office/drawing/2014/main" xmlns="" id="{BEA0097E-3BD3-487A-B8A7-258CC9370B97}"/>
               </a:ext>
             </a:extLst>
           </p:cNvPr>
@@ -2436,7 +2436,7 @@
           <p:cNvPr id="7" name="Slide Number Placeholder 6">
             <a:extLst>
               <a:ext uri="{FF2B5EF4-FFF2-40B4-BE49-F238E27FC236}">
-                <a16:creationId xmlns:a16="http://schemas.microsoft.com/office/drawing/2014/main" id="{629B8BE0-FE73-4321-A8F9-5E30C5D16474}"/>
+                <a16:creationId xmlns:a16="http://schemas.microsoft.com/office/drawing/2014/main" xmlns="" id="{629B8BE0-FE73-4321-A8F9-5E30C5D16474}"/>
               </a:ext>
             </a:extLst>
           </p:cNvPr>
@@ -2495,7 +2495,7 @@
           <p:cNvPr id="2" name="Title 1">
             <a:extLst>
               <a:ext uri="{FF2B5EF4-FFF2-40B4-BE49-F238E27FC236}">
-                <a16:creationId xmlns:a16="http://schemas.microsoft.com/office/drawing/2014/main" id="{4CC3F79A-E585-4B13-A696-B4DE273CB1FD}"/>
+                <a16:creationId xmlns:a16="http://schemas.microsoft.com/office/drawing/2014/main" xmlns="" id="{4CC3F79A-E585-4B13-A696-B4DE273CB1FD}"/>
               </a:ext>
             </a:extLst>
           </p:cNvPr>
@@ -2533,7 +2533,7 @@
           <p:cNvPr id="3" name="Picture Placeholder 2">
             <a:extLst>
               <a:ext uri="{FF2B5EF4-FFF2-40B4-BE49-F238E27FC236}">
-                <a16:creationId xmlns:a16="http://schemas.microsoft.com/office/drawing/2014/main" id="{47C75A88-25E9-48B9-8EDA-D58A64BF7EAD}"/>
+                <a16:creationId xmlns:a16="http://schemas.microsoft.com/office/drawing/2014/main" xmlns="" id="{47C75A88-25E9-48B9-8EDA-D58A64BF7EAD}"/>
               </a:ext>
             </a:extLst>
           </p:cNvPr>
@@ -2600,7 +2600,7 @@
           <p:cNvPr id="4" name="Text Placeholder 3">
             <a:extLst>
               <a:ext uri="{FF2B5EF4-FFF2-40B4-BE49-F238E27FC236}">
-                <a16:creationId xmlns:a16="http://schemas.microsoft.com/office/drawing/2014/main" id="{549B6839-8DAA-4610-A1C2-86C2ADF93745}"/>
+                <a16:creationId xmlns:a16="http://schemas.microsoft.com/office/drawing/2014/main" xmlns="" id="{549B6839-8DAA-4610-A1C2-86C2ADF93745}"/>
               </a:ext>
             </a:extLst>
           </p:cNvPr>
@@ -2671,7 +2671,7 @@
           <p:cNvPr id="5" name="Date Placeholder 4">
             <a:extLst>
               <a:ext uri="{FF2B5EF4-FFF2-40B4-BE49-F238E27FC236}">
-                <a16:creationId xmlns:a16="http://schemas.microsoft.com/office/drawing/2014/main" id="{88F15C85-C5E4-46CB-8DE2-6AE2F1CBDD1B}"/>
+                <a16:creationId xmlns:a16="http://schemas.microsoft.com/office/drawing/2014/main" xmlns="" id="{88F15C85-C5E4-46CB-8DE2-6AE2F1CBDD1B}"/>
               </a:ext>
             </a:extLst>
           </p:cNvPr>
@@ -2689,7 +2689,7 @@
           <a:p>
             <a:fld id="{CBC8E649-B73B-4477-B0E0-354D57AB8D4C}" type="datetimeFigureOut">
               <a:rPr lang="en-SG" smtClean="0"/>
-              <a:t>17/10/2018</a:t>
+              <a:t>15/11/2018</a:t>
             </a:fld>
             <a:endParaRPr lang="en-SG"/>
           </a:p>
@@ -2700,7 +2700,7 @@
           <p:cNvPr id="6" name="Footer Placeholder 5">
             <a:extLst>
               <a:ext uri="{FF2B5EF4-FFF2-40B4-BE49-F238E27FC236}">
-                <a16:creationId xmlns:a16="http://schemas.microsoft.com/office/drawing/2014/main" id="{183BF1F1-795A-4595-B1B2-8AB0D8F5C097}"/>
+                <a16:creationId xmlns:a16="http://schemas.microsoft.com/office/drawing/2014/main" xmlns="" id="{183BF1F1-795A-4595-B1B2-8AB0D8F5C097}"/>
               </a:ext>
             </a:extLst>
           </p:cNvPr>
@@ -2725,7 +2725,7 @@
           <p:cNvPr id="7" name="Slide Number Placeholder 6">
             <a:extLst>
               <a:ext uri="{FF2B5EF4-FFF2-40B4-BE49-F238E27FC236}">
-                <a16:creationId xmlns:a16="http://schemas.microsoft.com/office/drawing/2014/main" id="{FE953078-27AB-458B-AEFE-93AB18A4A81B}"/>
+                <a16:creationId xmlns:a16="http://schemas.microsoft.com/office/drawing/2014/main" xmlns="" id="{FE953078-27AB-458B-AEFE-93AB18A4A81B}"/>
               </a:ext>
             </a:extLst>
           </p:cNvPr>
@@ -2789,7 +2789,7 @@
           <p:cNvPr id="2" name="Title Placeholder 1">
             <a:extLst>
               <a:ext uri="{FF2B5EF4-FFF2-40B4-BE49-F238E27FC236}">
-                <a16:creationId xmlns:a16="http://schemas.microsoft.com/office/drawing/2014/main" id="{CFC6B47E-E0A9-4F25-8EC3-40BA815818E9}"/>
+                <a16:creationId xmlns:a16="http://schemas.microsoft.com/office/drawing/2014/main" xmlns="" id="{CFC6B47E-E0A9-4F25-8EC3-40BA815818E9}"/>
               </a:ext>
             </a:extLst>
           </p:cNvPr>
@@ -2828,7 +2828,7 @@
           <p:cNvPr id="3" name="Text Placeholder 2">
             <a:extLst>
               <a:ext uri="{FF2B5EF4-FFF2-40B4-BE49-F238E27FC236}">
-                <a16:creationId xmlns:a16="http://schemas.microsoft.com/office/drawing/2014/main" id="{92EECBD5-C1F9-4BD2-AC3C-9A20711F9E58}"/>
+                <a16:creationId xmlns:a16="http://schemas.microsoft.com/office/drawing/2014/main" xmlns="" id="{92EECBD5-C1F9-4BD2-AC3C-9A20711F9E58}"/>
               </a:ext>
             </a:extLst>
           </p:cNvPr>
@@ -2896,7 +2896,7 @@
           <p:cNvPr id="4" name="Date Placeholder 3">
             <a:extLst>
               <a:ext uri="{FF2B5EF4-FFF2-40B4-BE49-F238E27FC236}">
-                <a16:creationId xmlns:a16="http://schemas.microsoft.com/office/drawing/2014/main" id="{A5EFA1A3-F797-4C33-A183-2A23D6D32364}"/>
+                <a16:creationId xmlns:a16="http://schemas.microsoft.com/office/drawing/2014/main" xmlns="" id="{A5EFA1A3-F797-4C33-A183-2A23D6D32364}"/>
               </a:ext>
             </a:extLst>
           </p:cNvPr>
@@ -2932,7 +2932,7 @@
           <a:p>
             <a:fld id="{CBC8E649-B73B-4477-B0E0-354D57AB8D4C}" type="datetimeFigureOut">
               <a:rPr lang="en-SG" smtClean="0"/>
-              <a:t>17/10/2018</a:t>
+              <a:t>15/11/2018</a:t>
             </a:fld>
             <a:endParaRPr lang="en-SG"/>
           </a:p>
@@ -2943,7 +2943,7 @@
           <p:cNvPr id="5" name="Footer Placeholder 4">
             <a:extLst>
               <a:ext uri="{FF2B5EF4-FFF2-40B4-BE49-F238E27FC236}">
-                <a16:creationId xmlns:a16="http://schemas.microsoft.com/office/drawing/2014/main" id="{9935509B-DA4D-48A2-B446-77DD285274DD}"/>
+                <a16:creationId xmlns:a16="http://schemas.microsoft.com/office/drawing/2014/main" xmlns="" id="{9935509B-DA4D-48A2-B446-77DD285274DD}"/>
               </a:ext>
             </a:extLst>
           </p:cNvPr>
@@ -2986,7 +2986,7 @@
           <p:cNvPr id="6" name="Slide Number Placeholder 5">
             <a:extLst>
               <a:ext uri="{FF2B5EF4-FFF2-40B4-BE49-F238E27FC236}">
-                <a16:creationId xmlns:a16="http://schemas.microsoft.com/office/drawing/2014/main" id="{B54356F6-D3E7-4AA9-B706-B4D062EF8B06}"/>
+                <a16:creationId xmlns:a16="http://schemas.microsoft.com/office/drawing/2014/main" xmlns="" id="{B54356F6-D3E7-4AA9-B706-B4D062EF8B06}"/>
               </a:ext>
             </a:extLst>
           </p:cNvPr>
@@ -3354,7 +3354,7 @@
           <p:cNvPr id="7" name="Straight Arrow Connector 6">
             <a:extLst>
               <a:ext uri="{FF2B5EF4-FFF2-40B4-BE49-F238E27FC236}">
-                <a16:creationId xmlns:a16="http://schemas.microsoft.com/office/drawing/2014/main" id="{C2F2CD63-11E1-4E7F-9C1E-305D9AB671EC}"/>
+                <a16:creationId xmlns:a16="http://schemas.microsoft.com/office/drawing/2014/main" xmlns="" id="{C2F2CD63-11E1-4E7F-9C1E-305D9AB671EC}"/>
               </a:ext>
             </a:extLst>
           </p:cNvPr>
@@ -3395,7 +3395,7 @@
           <p:cNvPr id="11" name="Straight Arrow Connector 10">
             <a:extLst>
               <a:ext uri="{FF2B5EF4-FFF2-40B4-BE49-F238E27FC236}">
-                <a16:creationId xmlns:a16="http://schemas.microsoft.com/office/drawing/2014/main" id="{C3FAA6B6-4E7C-42CA-99A3-23B9413E0619}"/>
+                <a16:creationId xmlns:a16="http://schemas.microsoft.com/office/drawing/2014/main" xmlns="" id="{C3FAA6B6-4E7C-42CA-99A3-23B9413E0619}"/>
               </a:ext>
             </a:extLst>
           </p:cNvPr>
@@ -3437,7 +3437,7 @@
           <p:cNvPr id="15" name="Straight Arrow Connector 14">
             <a:extLst>
               <a:ext uri="{FF2B5EF4-FFF2-40B4-BE49-F238E27FC236}">
-                <a16:creationId xmlns:a16="http://schemas.microsoft.com/office/drawing/2014/main" id="{6F0A8942-EC0B-44E1-A693-765BADE9F684}"/>
+                <a16:creationId xmlns:a16="http://schemas.microsoft.com/office/drawing/2014/main" xmlns="" id="{6F0A8942-EC0B-44E1-A693-765BADE9F684}"/>
               </a:ext>
             </a:extLst>
           </p:cNvPr>
@@ -3478,7 +3478,7 @@
           <p:cNvPr id="16" name="Straight Arrow Connector 15">
             <a:extLst>
               <a:ext uri="{FF2B5EF4-FFF2-40B4-BE49-F238E27FC236}">
-                <a16:creationId xmlns:a16="http://schemas.microsoft.com/office/drawing/2014/main" id="{B339AE71-234B-45FD-9B14-C52F3B6C1309}"/>
+                <a16:creationId xmlns:a16="http://schemas.microsoft.com/office/drawing/2014/main" xmlns="" id="{B339AE71-234B-45FD-9B14-C52F3B6C1309}"/>
               </a:ext>
             </a:extLst>
           </p:cNvPr>
@@ -3519,7 +3519,7 @@
           <p:cNvPr id="18" name="Straight Arrow Connector 17">
             <a:extLst>
               <a:ext uri="{FF2B5EF4-FFF2-40B4-BE49-F238E27FC236}">
-                <a16:creationId xmlns:a16="http://schemas.microsoft.com/office/drawing/2014/main" id="{C4A85CEA-0272-41F1-9735-9F3A6B269288}"/>
+                <a16:creationId xmlns:a16="http://schemas.microsoft.com/office/drawing/2014/main" xmlns="" id="{C4A85CEA-0272-41F1-9735-9F3A6B269288}"/>
               </a:ext>
             </a:extLst>
           </p:cNvPr>
@@ -3561,7 +3561,7 @@
           <p:cNvPr id="23" name="Straight Arrow Connector 22">
             <a:extLst>
               <a:ext uri="{FF2B5EF4-FFF2-40B4-BE49-F238E27FC236}">
-                <a16:creationId xmlns:a16="http://schemas.microsoft.com/office/drawing/2014/main" id="{32B003DE-CB34-40D8-B2DE-3A71356284FB}"/>
+                <a16:creationId xmlns:a16="http://schemas.microsoft.com/office/drawing/2014/main" xmlns="" id="{32B003DE-CB34-40D8-B2DE-3A71356284FB}"/>
               </a:ext>
             </a:extLst>
           </p:cNvPr>
@@ -3603,7 +3603,7 @@
           <p:cNvPr id="25" name="Straight Arrow Connector 24">
             <a:extLst>
               <a:ext uri="{FF2B5EF4-FFF2-40B4-BE49-F238E27FC236}">
-                <a16:creationId xmlns:a16="http://schemas.microsoft.com/office/drawing/2014/main" id="{B40BF423-5638-474A-9093-45EA5183C459}"/>
+                <a16:creationId xmlns:a16="http://schemas.microsoft.com/office/drawing/2014/main" xmlns="" id="{B40BF423-5638-474A-9093-45EA5183C459}"/>
               </a:ext>
             </a:extLst>
           </p:cNvPr>
@@ -3645,7 +3645,7 @@
           <p:cNvPr id="26" name="Straight Arrow Connector 25">
             <a:extLst>
               <a:ext uri="{FF2B5EF4-FFF2-40B4-BE49-F238E27FC236}">
-                <a16:creationId xmlns:a16="http://schemas.microsoft.com/office/drawing/2014/main" id="{019FB79C-DE3C-431A-91C7-EDB7948D8C2A}"/>
+                <a16:creationId xmlns:a16="http://schemas.microsoft.com/office/drawing/2014/main" xmlns="" id="{019FB79C-DE3C-431A-91C7-EDB7948D8C2A}"/>
               </a:ext>
             </a:extLst>
           </p:cNvPr>
@@ -3687,7 +3687,7 @@
           <p:cNvPr id="28" name="Straight Arrow Connector 27">
             <a:extLst>
               <a:ext uri="{FF2B5EF4-FFF2-40B4-BE49-F238E27FC236}">
-                <a16:creationId xmlns:a16="http://schemas.microsoft.com/office/drawing/2014/main" id="{6621F93F-E3F5-45CA-A854-314026A9AB0B}"/>
+                <a16:creationId xmlns:a16="http://schemas.microsoft.com/office/drawing/2014/main" xmlns="" id="{6621F93F-E3F5-45CA-A854-314026A9AB0B}"/>
               </a:ext>
             </a:extLst>
           </p:cNvPr>
@@ -3729,7 +3729,7 @@
           <p:cNvPr id="30" name="Straight Arrow Connector 29">
             <a:extLst>
               <a:ext uri="{FF2B5EF4-FFF2-40B4-BE49-F238E27FC236}">
-                <a16:creationId xmlns:a16="http://schemas.microsoft.com/office/drawing/2014/main" id="{705CFACD-44EA-4002-AF5B-B3FA5064128E}"/>
+                <a16:creationId xmlns:a16="http://schemas.microsoft.com/office/drawing/2014/main" xmlns="" id="{705CFACD-44EA-4002-AF5B-B3FA5064128E}"/>
               </a:ext>
             </a:extLst>
           </p:cNvPr>
@@ -3771,7 +3771,7 @@
           <p:cNvPr id="36" name="Straight Arrow Connector 35">
             <a:extLst>
               <a:ext uri="{FF2B5EF4-FFF2-40B4-BE49-F238E27FC236}">
-                <a16:creationId xmlns:a16="http://schemas.microsoft.com/office/drawing/2014/main" id="{E49CE7E6-F713-4098-8B18-C2BF94F13DD8}"/>
+                <a16:creationId xmlns:a16="http://schemas.microsoft.com/office/drawing/2014/main" xmlns="" id="{E49CE7E6-F713-4098-8B18-C2BF94F13DD8}"/>
               </a:ext>
             </a:extLst>
           </p:cNvPr>
@@ -3813,7 +3813,7 @@
           <p:cNvPr id="37" name="Straight Arrow Connector 36">
             <a:extLst>
               <a:ext uri="{FF2B5EF4-FFF2-40B4-BE49-F238E27FC236}">
-                <a16:creationId xmlns:a16="http://schemas.microsoft.com/office/drawing/2014/main" id="{25465AFC-B13F-4F33-820B-5B23289A48E0}"/>
+                <a16:creationId xmlns:a16="http://schemas.microsoft.com/office/drawing/2014/main" xmlns="" id="{25465AFC-B13F-4F33-820B-5B23289A48E0}"/>
               </a:ext>
             </a:extLst>
           </p:cNvPr>
@@ -3855,7 +3855,7 @@
           <p:cNvPr id="38" name="Straight Arrow Connector 37">
             <a:extLst>
               <a:ext uri="{FF2B5EF4-FFF2-40B4-BE49-F238E27FC236}">
-                <a16:creationId xmlns:a16="http://schemas.microsoft.com/office/drawing/2014/main" id="{BAEA73CD-017F-48D5-8E06-E1919CA36918}"/>
+                <a16:creationId xmlns:a16="http://schemas.microsoft.com/office/drawing/2014/main" xmlns="" id="{BAEA73CD-017F-48D5-8E06-E1919CA36918}"/>
               </a:ext>
             </a:extLst>
           </p:cNvPr>
@@ -3897,7 +3897,7 @@
           <p:cNvPr id="39" name="Straight Arrow Connector 38">
             <a:extLst>
               <a:ext uri="{FF2B5EF4-FFF2-40B4-BE49-F238E27FC236}">
-                <a16:creationId xmlns:a16="http://schemas.microsoft.com/office/drawing/2014/main" id="{0D8F2E54-EFC5-4866-9267-E1A313E937F3}"/>
+                <a16:creationId xmlns:a16="http://schemas.microsoft.com/office/drawing/2014/main" xmlns="" id="{0D8F2E54-EFC5-4866-9267-E1A313E937F3}"/>
               </a:ext>
             </a:extLst>
           </p:cNvPr>
@@ -3939,7 +3939,7 @@
           <p:cNvPr id="40" name="Straight Arrow Connector 39">
             <a:extLst>
               <a:ext uri="{FF2B5EF4-FFF2-40B4-BE49-F238E27FC236}">
-                <a16:creationId xmlns:a16="http://schemas.microsoft.com/office/drawing/2014/main" id="{6C12839F-7CE3-4B9B-BB00-823188DF88C1}"/>
+                <a16:creationId xmlns:a16="http://schemas.microsoft.com/office/drawing/2014/main" xmlns="" id="{6C12839F-7CE3-4B9B-BB00-823188DF88C1}"/>
               </a:ext>
             </a:extLst>
           </p:cNvPr>
@@ -3981,7 +3981,7 @@
           <p:cNvPr id="41" name="TextBox 40">
             <a:extLst>
               <a:ext uri="{FF2B5EF4-FFF2-40B4-BE49-F238E27FC236}">
-                <a16:creationId xmlns:a16="http://schemas.microsoft.com/office/drawing/2014/main" id="{C796C729-8358-43FA-8301-1E11A6EC0257}"/>
+                <a16:creationId xmlns:a16="http://schemas.microsoft.com/office/drawing/2014/main" xmlns="" id="{C796C729-8358-43FA-8301-1E11A6EC0257}"/>
               </a:ext>
             </a:extLst>
           </p:cNvPr>
@@ -4016,7 +4016,7 @@
           <p:cNvPr id="42" name="TextBox 41">
             <a:extLst>
               <a:ext uri="{FF2B5EF4-FFF2-40B4-BE49-F238E27FC236}">
-                <a16:creationId xmlns:a16="http://schemas.microsoft.com/office/drawing/2014/main" id="{509F0AB0-13B5-44BA-9B29-AD01E0C82B48}"/>
+                <a16:creationId xmlns:a16="http://schemas.microsoft.com/office/drawing/2014/main" xmlns="" id="{509F0AB0-13B5-44BA-9B29-AD01E0C82B48}"/>
               </a:ext>
             </a:extLst>
           </p:cNvPr>
@@ -4051,7 +4051,7 @@
           <p:cNvPr id="43" name="TextBox 42">
             <a:extLst>
               <a:ext uri="{FF2B5EF4-FFF2-40B4-BE49-F238E27FC236}">
-                <a16:creationId xmlns:a16="http://schemas.microsoft.com/office/drawing/2014/main" id="{098833C2-9929-4EB0-96F2-BA4EE48960EC}"/>
+                <a16:creationId xmlns:a16="http://schemas.microsoft.com/office/drawing/2014/main" xmlns="" id="{098833C2-9929-4EB0-96F2-BA4EE48960EC}"/>
               </a:ext>
             </a:extLst>
           </p:cNvPr>
@@ -4086,7 +4086,7 @@
           <p:cNvPr id="44" name="TextBox 43">
             <a:extLst>
               <a:ext uri="{FF2B5EF4-FFF2-40B4-BE49-F238E27FC236}">
-                <a16:creationId xmlns:a16="http://schemas.microsoft.com/office/drawing/2014/main" id="{B1103631-D49D-4393-9E5F-2892544F5216}"/>
+                <a16:creationId xmlns:a16="http://schemas.microsoft.com/office/drawing/2014/main" xmlns="" id="{B1103631-D49D-4393-9E5F-2892544F5216}"/>
               </a:ext>
             </a:extLst>
           </p:cNvPr>
@@ -4121,7 +4121,7 @@
           <p:cNvPr id="45" name="TextBox 44">
             <a:extLst>
               <a:ext uri="{FF2B5EF4-FFF2-40B4-BE49-F238E27FC236}">
-                <a16:creationId xmlns:a16="http://schemas.microsoft.com/office/drawing/2014/main" id="{F2A2B9FF-FDA6-4620-8F4B-7D510B7E3C49}"/>
+                <a16:creationId xmlns:a16="http://schemas.microsoft.com/office/drawing/2014/main" xmlns="" id="{F2A2B9FF-FDA6-4620-8F4B-7D510B7E3C49}"/>
               </a:ext>
             </a:extLst>
           </p:cNvPr>
@@ -4156,7 +4156,7 @@
           <p:cNvPr id="48" name="TextBox 47">
             <a:extLst>
               <a:ext uri="{FF2B5EF4-FFF2-40B4-BE49-F238E27FC236}">
-                <a16:creationId xmlns:a16="http://schemas.microsoft.com/office/drawing/2014/main" id="{CB7510C0-1493-4259-9494-65759E18C126}"/>
+                <a16:creationId xmlns:a16="http://schemas.microsoft.com/office/drawing/2014/main" xmlns="" id="{CB7510C0-1493-4259-9494-65759E18C126}"/>
               </a:ext>
             </a:extLst>
           </p:cNvPr>
@@ -4191,7 +4191,7 @@
           <p:cNvPr id="50" name="TextBox 49">
             <a:extLst>
               <a:ext uri="{FF2B5EF4-FFF2-40B4-BE49-F238E27FC236}">
-                <a16:creationId xmlns:a16="http://schemas.microsoft.com/office/drawing/2014/main" id="{06C65B33-CF2C-4136-8A7A-5E69FEC1B073}"/>
+                <a16:creationId xmlns:a16="http://schemas.microsoft.com/office/drawing/2014/main" xmlns="" id="{06C65B33-CF2C-4136-8A7A-5E69FEC1B073}"/>
               </a:ext>
             </a:extLst>
           </p:cNvPr>
@@ -4226,7 +4226,7 @@
           <p:cNvPr id="51" name="TextBox 50">
             <a:extLst>
               <a:ext uri="{FF2B5EF4-FFF2-40B4-BE49-F238E27FC236}">
-                <a16:creationId xmlns:a16="http://schemas.microsoft.com/office/drawing/2014/main" id="{91B26C13-0287-4131-8AE8-B7BEB313400E}"/>
+                <a16:creationId xmlns:a16="http://schemas.microsoft.com/office/drawing/2014/main" xmlns="" id="{91B26C13-0287-4131-8AE8-B7BEB313400E}"/>
               </a:ext>
             </a:extLst>
           </p:cNvPr>
@@ -4261,7 +4261,7 @@
           <p:cNvPr id="52" name="TextBox 51">
             <a:extLst>
               <a:ext uri="{FF2B5EF4-FFF2-40B4-BE49-F238E27FC236}">
-                <a16:creationId xmlns:a16="http://schemas.microsoft.com/office/drawing/2014/main" id="{ABDFCF85-4047-4E11-BB88-E40499CEE5F2}"/>
+                <a16:creationId xmlns:a16="http://schemas.microsoft.com/office/drawing/2014/main" xmlns="" id="{ABDFCF85-4047-4E11-BB88-E40499CEE5F2}"/>
               </a:ext>
             </a:extLst>
           </p:cNvPr>
@@ -4296,7 +4296,7 @@
           <p:cNvPr id="53" name="TextBox 52">
             <a:extLst>
               <a:ext uri="{FF2B5EF4-FFF2-40B4-BE49-F238E27FC236}">
-                <a16:creationId xmlns:a16="http://schemas.microsoft.com/office/drawing/2014/main" id="{1480CF28-BE15-42BD-9274-370571074011}"/>
+                <a16:creationId xmlns:a16="http://schemas.microsoft.com/office/drawing/2014/main" xmlns="" id="{1480CF28-BE15-42BD-9274-370571074011}"/>
               </a:ext>
             </a:extLst>
           </p:cNvPr>
@@ -4331,7 +4331,7 @@
           <p:cNvPr id="54" name="TextBox 53">
             <a:extLst>
               <a:ext uri="{FF2B5EF4-FFF2-40B4-BE49-F238E27FC236}">
-                <a16:creationId xmlns:a16="http://schemas.microsoft.com/office/drawing/2014/main" id="{AE82F02F-3C11-48F9-A182-8A9298972A1E}"/>
+                <a16:creationId xmlns:a16="http://schemas.microsoft.com/office/drawing/2014/main" xmlns="" id="{AE82F02F-3C11-48F9-A182-8A9298972A1E}"/>
               </a:ext>
             </a:extLst>
           </p:cNvPr>
@@ -4366,7 +4366,7 @@
           <p:cNvPr id="55" name="TextBox 54">
             <a:extLst>
               <a:ext uri="{FF2B5EF4-FFF2-40B4-BE49-F238E27FC236}">
-                <a16:creationId xmlns:a16="http://schemas.microsoft.com/office/drawing/2014/main" id="{50E0B5D0-D3EB-46C7-B705-61870296171D}"/>
+                <a16:creationId xmlns:a16="http://schemas.microsoft.com/office/drawing/2014/main" xmlns="" id="{50E0B5D0-D3EB-46C7-B705-61870296171D}"/>
               </a:ext>
             </a:extLst>
           </p:cNvPr>
@@ -4401,7 +4401,7 @@
           <p:cNvPr id="56" name="TextBox 55">
             <a:extLst>
               <a:ext uri="{FF2B5EF4-FFF2-40B4-BE49-F238E27FC236}">
-                <a16:creationId xmlns:a16="http://schemas.microsoft.com/office/drawing/2014/main" id="{0B497053-B569-4A0F-BF67-B9E65803D7E8}"/>
+                <a16:creationId xmlns:a16="http://schemas.microsoft.com/office/drawing/2014/main" xmlns="" id="{0B497053-B569-4A0F-BF67-B9E65803D7E8}"/>
               </a:ext>
             </a:extLst>
           </p:cNvPr>
@@ -4436,7 +4436,7 @@
           <p:cNvPr id="57" name="Straight Arrow Connector 56">
             <a:extLst>
               <a:ext uri="{FF2B5EF4-FFF2-40B4-BE49-F238E27FC236}">
-                <a16:creationId xmlns:a16="http://schemas.microsoft.com/office/drawing/2014/main" id="{254D9F12-84CA-40A1-A5CA-9E6F41760006}"/>
+                <a16:creationId xmlns:a16="http://schemas.microsoft.com/office/drawing/2014/main" xmlns="" id="{254D9F12-84CA-40A1-A5CA-9E6F41760006}"/>
               </a:ext>
             </a:extLst>
           </p:cNvPr>
@@ -4478,7 +4478,7 @@
           <p:cNvPr id="58" name="TextBox 57">
             <a:extLst>
               <a:ext uri="{FF2B5EF4-FFF2-40B4-BE49-F238E27FC236}">
-                <a16:creationId xmlns:a16="http://schemas.microsoft.com/office/drawing/2014/main" id="{D4E733C2-3527-4A7B-A277-A97C05E33E22}"/>
+                <a16:creationId xmlns:a16="http://schemas.microsoft.com/office/drawing/2014/main" xmlns="" id="{D4E733C2-3527-4A7B-A277-A97C05E33E22}"/>
               </a:ext>
             </a:extLst>
           </p:cNvPr>
@@ -4543,7 +4543,7 @@
           <p:cNvPr id="7" name="Straight Arrow Connector 6">
             <a:extLst>
               <a:ext uri="{FF2B5EF4-FFF2-40B4-BE49-F238E27FC236}">
-                <a16:creationId xmlns:a16="http://schemas.microsoft.com/office/drawing/2014/main" id="{C2F2CD63-11E1-4E7F-9C1E-305D9AB671EC}"/>
+                <a16:creationId xmlns:a16="http://schemas.microsoft.com/office/drawing/2014/main" xmlns="" id="{C2F2CD63-11E1-4E7F-9C1E-305D9AB671EC}"/>
               </a:ext>
             </a:extLst>
           </p:cNvPr>
@@ -4584,7 +4584,7 @@
           <p:cNvPr id="11" name="Straight Arrow Connector 10">
             <a:extLst>
               <a:ext uri="{FF2B5EF4-FFF2-40B4-BE49-F238E27FC236}">
-                <a16:creationId xmlns:a16="http://schemas.microsoft.com/office/drawing/2014/main" id="{C3FAA6B6-4E7C-42CA-99A3-23B9413E0619}"/>
+                <a16:creationId xmlns:a16="http://schemas.microsoft.com/office/drawing/2014/main" xmlns="" id="{C3FAA6B6-4E7C-42CA-99A3-23B9413E0619}"/>
               </a:ext>
             </a:extLst>
           </p:cNvPr>
@@ -4626,7 +4626,7 @@
           <p:cNvPr id="15" name="Straight Arrow Connector 14">
             <a:extLst>
               <a:ext uri="{FF2B5EF4-FFF2-40B4-BE49-F238E27FC236}">
-                <a16:creationId xmlns:a16="http://schemas.microsoft.com/office/drawing/2014/main" id="{6F0A8942-EC0B-44E1-A693-765BADE9F684}"/>
+                <a16:creationId xmlns:a16="http://schemas.microsoft.com/office/drawing/2014/main" xmlns="" id="{6F0A8942-EC0B-44E1-A693-765BADE9F684}"/>
               </a:ext>
             </a:extLst>
           </p:cNvPr>
@@ -4667,7 +4667,7 @@
           <p:cNvPr id="16" name="Straight Arrow Connector 15">
             <a:extLst>
               <a:ext uri="{FF2B5EF4-FFF2-40B4-BE49-F238E27FC236}">
-                <a16:creationId xmlns:a16="http://schemas.microsoft.com/office/drawing/2014/main" id="{B339AE71-234B-45FD-9B14-C52F3B6C1309}"/>
+                <a16:creationId xmlns:a16="http://schemas.microsoft.com/office/drawing/2014/main" xmlns="" id="{B339AE71-234B-45FD-9B14-C52F3B6C1309}"/>
               </a:ext>
             </a:extLst>
           </p:cNvPr>
@@ -4708,7 +4708,7 @@
           <p:cNvPr id="18" name="Straight Arrow Connector 17">
             <a:extLst>
               <a:ext uri="{FF2B5EF4-FFF2-40B4-BE49-F238E27FC236}">
-                <a16:creationId xmlns:a16="http://schemas.microsoft.com/office/drawing/2014/main" id="{C4A85CEA-0272-41F1-9735-9F3A6B269288}"/>
+                <a16:creationId xmlns:a16="http://schemas.microsoft.com/office/drawing/2014/main" xmlns="" id="{C4A85CEA-0272-41F1-9735-9F3A6B269288}"/>
               </a:ext>
             </a:extLst>
           </p:cNvPr>
@@ -4750,7 +4750,7 @@
           <p:cNvPr id="23" name="Straight Arrow Connector 22">
             <a:extLst>
               <a:ext uri="{FF2B5EF4-FFF2-40B4-BE49-F238E27FC236}">
-                <a16:creationId xmlns:a16="http://schemas.microsoft.com/office/drawing/2014/main" id="{32B003DE-CB34-40D8-B2DE-3A71356284FB}"/>
+                <a16:creationId xmlns:a16="http://schemas.microsoft.com/office/drawing/2014/main" xmlns="" id="{32B003DE-CB34-40D8-B2DE-3A71356284FB}"/>
               </a:ext>
             </a:extLst>
           </p:cNvPr>
@@ -4792,7 +4792,7 @@
           <p:cNvPr id="25" name="Straight Arrow Connector 24">
             <a:extLst>
               <a:ext uri="{FF2B5EF4-FFF2-40B4-BE49-F238E27FC236}">
-                <a16:creationId xmlns:a16="http://schemas.microsoft.com/office/drawing/2014/main" id="{B40BF423-5638-474A-9093-45EA5183C459}"/>
+                <a16:creationId xmlns:a16="http://schemas.microsoft.com/office/drawing/2014/main" xmlns="" id="{B40BF423-5638-474A-9093-45EA5183C459}"/>
               </a:ext>
             </a:extLst>
           </p:cNvPr>
@@ -4834,7 +4834,7 @@
           <p:cNvPr id="26" name="Straight Arrow Connector 25">
             <a:extLst>
               <a:ext uri="{FF2B5EF4-FFF2-40B4-BE49-F238E27FC236}">
-                <a16:creationId xmlns:a16="http://schemas.microsoft.com/office/drawing/2014/main" id="{019FB79C-DE3C-431A-91C7-EDB7948D8C2A}"/>
+                <a16:creationId xmlns:a16="http://schemas.microsoft.com/office/drawing/2014/main" xmlns="" id="{019FB79C-DE3C-431A-91C7-EDB7948D8C2A}"/>
               </a:ext>
             </a:extLst>
           </p:cNvPr>
@@ -4876,7 +4876,7 @@
           <p:cNvPr id="28" name="Straight Arrow Connector 27">
             <a:extLst>
               <a:ext uri="{FF2B5EF4-FFF2-40B4-BE49-F238E27FC236}">
-                <a16:creationId xmlns:a16="http://schemas.microsoft.com/office/drawing/2014/main" id="{6621F93F-E3F5-45CA-A854-314026A9AB0B}"/>
+                <a16:creationId xmlns:a16="http://schemas.microsoft.com/office/drawing/2014/main" xmlns="" id="{6621F93F-E3F5-45CA-A854-314026A9AB0B}"/>
               </a:ext>
             </a:extLst>
           </p:cNvPr>
@@ -4918,7 +4918,7 @@
           <p:cNvPr id="30" name="Straight Arrow Connector 29">
             <a:extLst>
               <a:ext uri="{FF2B5EF4-FFF2-40B4-BE49-F238E27FC236}">
-                <a16:creationId xmlns:a16="http://schemas.microsoft.com/office/drawing/2014/main" id="{705CFACD-44EA-4002-AF5B-B3FA5064128E}"/>
+                <a16:creationId xmlns:a16="http://schemas.microsoft.com/office/drawing/2014/main" xmlns="" id="{705CFACD-44EA-4002-AF5B-B3FA5064128E}"/>
               </a:ext>
             </a:extLst>
           </p:cNvPr>
@@ -4960,7 +4960,7 @@
           <p:cNvPr id="36" name="Straight Arrow Connector 35">
             <a:extLst>
               <a:ext uri="{FF2B5EF4-FFF2-40B4-BE49-F238E27FC236}">
-                <a16:creationId xmlns:a16="http://schemas.microsoft.com/office/drawing/2014/main" id="{E49CE7E6-F713-4098-8B18-C2BF94F13DD8}"/>
+                <a16:creationId xmlns:a16="http://schemas.microsoft.com/office/drawing/2014/main" xmlns="" id="{E49CE7E6-F713-4098-8B18-C2BF94F13DD8}"/>
               </a:ext>
             </a:extLst>
           </p:cNvPr>
@@ -5002,7 +5002,7 @@
           <p:cNvPr id="38" name="Straight Arrow Connector 37">
             <a:extLst>
               <a:ext uri="{FF2B5EF4-FFF2-40B4-BE49-F238E27FC236}">
-                <a16:creationId xmlns:a16="http://schemas.microsoft.com/office/drawing/2014/main" id="{BAEA73CD-017F-48D5-8E06-E1919CA36918}"/>
+                <a16:creationId xmlns:a16="http://schemas.microsoft.com/office/drawing/2014/main" xmlns="" id="{BAEA73CD-017F-48D5-8E06-E1919CA36918}"/>
               </a:ext>
             </a:extLst>
           </p:cNvPr>
@@ -5044,7 +5044,7 @@
           <p:cNvPr id="41" name="TextBox 40">
             <a:extLst>
               <a:ext uri="{FF2B5EF4-FFF2-40B4-BE49-F238E27FC236}">
-                <a16:creationId xmlns:a16="http://schemas.microsoft.com/office/drawing/2014/main" id="{C796C729-8358-43FA-8301-1E11A6EC0257}"/>
+                <a16:creationId xmlns:a16="http://schemas.microsoft.com/office/drawing/2014/main" xmlns="" id="{C796C729-8358-43FA-8301-1E11A6EC0257}"/>
               </a:ext>
             </a:extLst>
           </p:cNvPr>
@@ -5079,7 +5079,7 @@
           <p:cNvPr id="42" name="TextBox 41">
             <a:extLst>
               <a:ext uri="{FF2B5EF4-FFF2-40B4-BE49-F238E27FC236}">
-                <a16:creationId xmlns:a16="http://schemas.microsoft.com/office/drawing/2014/main" id="{509F0AB0-13B5-44BA-9B29-AD01E0C82B48}"/>
+                <a16:creationId xmlns:a16="http://schemas.microsoft.com/office/drawing/2014/main" xmlns="" id="{509F0AB0-13B5-44BA-9B29-AD01E0C82B48}"/>
               </a:ext>
             </a:extLst>
           </p:cNvPr>
@@ -5114,7 +5114,7 @@
           <p:cNvPr id="43" name="TextBox 42">
             <a:extLst>
               <a:ext uri="{FF2B5EF4-FFF2-40B4-BE49-F238E27FC236}">
-                <a16:creationId xmlns:a16="http://schemas.microsoft.com/office/drawing/2014/main" id="{098833C2-9929-4EB0-96F2-BA4EE48960EC}"/>
+                <a16:creationId xmlns:a16="http://schemas.microsoft.com/office/drawing/2014/main" xmlns="" id="{098833C2-9929-4EB0-96F2-BA4EE48960EC}"/>
               </a:ext>
             </a:extLst>
           </p:cNvPr>
@@ -5149,7 +5149,7 @@
           <p:cNvPr id="44" name="TextBox 43">
             <a:extLst>
               <a:ext uri="{FF2B5EF4-FFF2-40B4-BE49-F238E27FC236}">
-                <a16:creationId xmlns:a16="http://schemas.microsoft.com/office/drawing/2014/main" id="{B1103631-D49D-4393-9E5F-2892544F5216}"/>
+                <a16:creationId xmlns:a16="http://schemas.microsoft.com/office/drawing/2014/main" xmlns="" id="{B1103631-D49D-4393-9E5F-2892544F5216}"/>
               </a:ext>
             </a:extLst>
           </p:cNvPr>
@@ -5184,7 +5184,7 @@
           <p:cNvPr id="45" name="TextBox 44">
             <a:extLst>
               <a:ext uri="{FF2B5EF4-FFF2-40B4-BE49-F238E27FC236}">
-                <a16:creationId xmlns:a16="http://schemas.microsoft.com/office/drawing/2014/main" id="{F2A2B9FF-FDA6-4620-8F4B-7D510B7E3C49}"/>
+                <a16:creationId xmlns:a16="http://schemas.microsoft.com/office/drawing/2014/main" xmlns="" id="{F2A2B9FF-FDA6-4620-8F4B-7D510B7E3C49}"/>
               </a:ext>
             </a:extLst>
           </p:cNvPr>
@@ -5219,7 +5219,7 @@
           <p:cNvPr id="48" name="TextBox 47">
             <a:extLst>
               <a:ext uri="{FF2B5EF4-FFF2-40B4-BE49-F238E27FC236}">
-                <a16:creationId xmlns:a16="http://schemas.microsoft.com/office/drawing/2014/main" id="{CB7510C0-1493-4259-9494-65759E18C126}"/>
+                <a16:creationId xmlns:a16="http://schemas.microsoft.com/office/drawing/2014/main" xmlns="" id="{CB7510C0-1493-4259-9494-65759E18C126}"/>
               </a:ext>
             </a:extLst>
           </p:cNvPr>
@@ -5254,7 +5254,7 @@
           <p:cNvPr id="52" name="TextBox 51">
             <a:extLst>
               <a:ext uri="{FF2B5EF4-FFF2-40B4-BE49-F238E27FC236}">
-                <a16:creationId xmlns:a16="http://schemas.microsoft.com/office/drawing/2014/main" id="{ABDFCF85-4047-4E11-BB88-E40499CEE5F2}"/>
+                <a16:creationId xmlns:a16="http://schemas.microsoft.com/office/drawing/2014/main" xmlns="" id="{ABDFCF85-4047-4E11-BB88-E40499CEE5F2}"/>
               </a:ext>
             </a:extLst>
           </p:cNvPr>
@@ -5289,7 +5289,7 @@
           <p:cNvPr id="53" name="TextBox 52">
             <a:extLst>
               <a:ext uri="{FF2B5EF4-FFF2-40B4-BE49-F238E27FC236}">
-                <a16:creationId xmlns:a16="http://schemas.microsoft.com/office/drawing/2014/main" id="{1480CF28-BE15-42BD-9274-370571074011}"/>
+                <a16:creationId xmlns:a16="http://schemas.microsoft.com/office/drawing/2014/main" xmlns="" id="{1480CF28-BE15-42BD-9274-370571074011}"/>
               </a:ext>
             </a:extLst>
           </p:cNvPr>
@@ -5324,7 +5324,7 @@
           <p:cNvPr id="54" name="TextBox 53">
             <a:extLst>
               <a:ext uri="{FF2B5EF4-FFF2-40B4-BE49-F238E27FC236}">
-                <a16:creationId xmlns:a16="http://schemas.microsoft.com/office/drawing/2014/main" id="{AE82F02F-3C11-48F9-A182-8A9298972A1E}"/>
+                <a16:creationId xmlns:a16="http://schemas.microsoft.com/office/drawing/2014/main" xmlns="" id="{AE82F02F-3C11-48F9-A182-8A9298972A1E}"/>
               </a:ext>
             </a:extLst>
           </p:cNvPr>
@@ -5359,7 +5359,7 @@
           <p:cNvPr id="55" name="TextBox 54">
             <a:extLst>
               <a:ext uri="{FF2B5EF4-FFF2-40B4-BE49-F238E27FC236}">
-                <a16:creationId xmlns:a16="http://schemas.microsoft.com/office/drawing/2014/main" id="{50E0B5D0-D3EB-46C7-B705-61870296171D}"/>
+                <a16:creationId xmlns:a16="http://schemas.microsoft.com/office/drawing/2014/main" xmlns="" id="{50E0B5D0-D3EB-46C7-B705-61870296171D}"/>
               </a:ext>
             </a:extLst>
           </p:cNvPr>
@@ -5394,7 +5394,7 @@
           <p:cNvPr id="56" name="TextBox 55">
             <a:extLst>
               <a:ext uri="{FF2B5EF4-FFF2-40B4-BE49-F238E27FC236}">
-                <a16:creationId xmlns:a16="http://schemas.microsoft.com/office/drawing/2014/main" id="{0B497053-B569-4A0F-BF67-B9E65803D7E8}"/>
+                <a16:creationId xmlns:a16="http://schemas.microsoft.com/office/drawing/2014/main" xmlns="" id="{0B497053-B569-4A0F-BF67-B9E65803D7E8}"/>
               </a:ext>
             </a:extLst>
           </p:cNvPr>
@@ -5429,7 +5429,7 @@
           <p:cNvPr id="57" name="Straight Arrow Connector 56">
             <a:extLst>
               <a:ext uri="{FF2B5EF4-FFF2-40B4-BE49-F238E27FC236}">
-                <a16:creationId xmlns:a16="http://schemas.microsoft.com/office/drawing/2014/main" id="{254D9F12-84CA-40A1-A5CA-9E6F41760006}"/>
+                <a16:creationId xmlns:a16="http://schemas.microsoft.com/office/drawing/2014/main" xmlns="" id="{254D9F12-84CA-40A1-A5CA-9E6F41760006}"/>
               </a:ext>
             </a:extLst>
           </p:cNvPr>
@@ -5471,7 +5471,7 @@
           <p:cNvPr id="58" name="TextBox 57">
             <a:extLst>
               <a:ext uri="{FF2B5EF4-FFF2-40B4-BE49-F238E27FC236}">
-                <a16:creationId xmlns:a16="http://schemas.microsoft.com/office/drawing/2014/main" id="{D4E733C2-3527-4A7B-A277-A97C05E33E22}"/>
+                <a16:creationId xmlns:a16="http://schemas.microsoft.com/office/drawing/2014/main" xmlns="" id="{D4E733C2-3527-4A7B-A277-A97C05E33E22}"/>
               </a:ext>
             </a:extLst>
           </p:cNvPr>
@@ -5506,7 +5506,7 @@
           <p:cNvPr id="32" name="Straight Arrow Connector 31">
             <a:extLst>
               <a:ext uri="{FF2B5EF4-FFF2-40B4-BE49-F238E27FC236}">
-                <a16:creationId xmlns:a16="http://schemas.microsoft.com/office/drawing/2014/main" id="{48882EC6-CE17-4603-9487-023E93D20ADF}"/>
+                <a16:creationId xmlns:a16="http://schemas.microsoft.com/office/drawing/2014/main" xmlns="" id="{48882EC6-CE17-4603-9487-023E93D20ADF}"/>
               </a:ext>
             </a:extLst>
           </p:cNvPr>
@@ -5517,7 +5517,7 @@
         </p:nvCxnSpPr>
         <p:spPr>
           <a:xfrm>
-            <a:off x="5449399" y="6099583"/>
+            <a:off x="5452961" y="5406366"/>
             <a:ext cx="1988988" cy="254741"/>
           </a:xfrm>
           <a:prstGeom prst="straightConnector1">
@@ -5548,7 +5548,7 @@
           <p:cNvPr id="33" name="TextBox 32">
             <a:extLst>
               <a:ext uri="{FF2B5EF4-FFF2-40B4-BE49-F238E27FC236}">
-                <a16:creationId xmlns:a16="http://schemas.microsoft.com/office/drawing/2014/main" id="{FD5238DE-6122-4201-B387-867479672558}"/>
+                <a16:creationId xmlns:a16="http://schemas.microsoft.com/office/drawing/2014/main" xmlns="" id="{FD5238DE-6122-4201-B387-867479672558}"/>
               </a:ext>
             </a:extLst>
           </p:cNvPr>
@@ -5557,7 +5557,7 @@
         </p:nvSpPr>
         <p:spPr>
           <a:xfrm rot="457508">
-            <a:off x="5505594" y="5963244"/>
+            <a:off x="5509156" y="5270027"/>
             <a:ext cx="1876604" cy="276999"/>
           </a:xfrm>
           <a:prstGeom prst="rect">
@@ -5578,54 +5578,12 @@
           </a:p>
         </p:txBody>
       </p:sp>
-      <p:cxnSp>
-        <p:nvCxnSpPr>
-          <p:cNvPr id="34" name="Straight Arrow Connector 33">
-            <a:extLst>
-              <a:ext uri="{FF2B5EF4-FFF2-40B4-BE49-F238E27FC236}">
-                <a16:creationId xmlns:a16="http://schemas.microsoft.com/office/drawing/2014/main" id="{CFDEB3CB-2159-4A9F-A689-BD2340EA3F2D}"/>
-              </a:ext>
-            </a:extLst>
-          </p:cNvPr>
-          <p:cNvCxnSpPr>
-            <a:cxnSpLocks/>
-          </p:cNvCxnSpPr>
-          <p:nvPr/>
-        </p:nvCxnSpPr>
-        <p:spPr>
-          <a:xfrm>
-            <a:off x="5460017" y="4302749"/>
-            <a:ext cx="1988988" cy="254741"/>
-          </a:xfrm>
-          <a:prstGeom prst="straightConnector1">
-            <a:avLst/>
-          </a:prstGeom>
-          <a:ln w="19050">
-            <a:prstDash val="dash"/>
-            <a:tailEnd type="triangle"/>
-          </a:ln>
-        </p:spPr>
-        <p:style>
-          <a:lnRef idx="1">
-            <a:schemeClr val="accent1"/>
-          </a:lnRef>
-          <a:fillRef idx="0">
-            <a:schemeClr val="accent1"/>
-          </a:fillRef>
-          <a:effectRef idx="0">
-            <a:schemeClr val="accent1"/>
-          </a:effectRef>
-          <a:fontRef idx="minor">
-            <a:schemeClr val="tx1"/>
-          </a:fontRef>
-        </p:style>
-      </p:cxnSp>
-      <p:sp>
-        <p:nvSpPr>
-          <p:cNvPr id="46" name="TextBox 45">
-            <a:extLst>
-              <a:ext uri="{FF2B5EF4-FFF2-40B4-BE49-F238E27FC236}">
-                <a16:creationId xmlns:a16="http://schemas.microsoft.com/office/drawing/2014/main" id="{051D1AC3-1A9C-4E88-9571-8F613EBAD0A7}"/>
+      <p:sp>
+        <p:nvSpPr>
+          <p:cNvPr id="47" name="TextBox 46">
+            <a:extLst>
+              <a:ext uri="{FF2B5EF4-FFF2-40B4-BE49-F238E27FC236}">
+                <a16:creationId xmlns:a16="http://schemas.microsoft.com/office/drawing/2014/main" xmlns="" id="{4CF8987F-F75E-42CD-902E-C31477D857C2}"/>
               </a:ext>
             </a:extLst>
           </p:cNvPr>
@@ -5634,42 +5592,7 @@
         </p:nvSpPr>
         <p:spPr>
           <a:xfrm rot="457508">
-            <a:off x="5445270" y="4164250"/>
-            <a:ext cx="2033505" cy="276999"/>
-          </a:xfrm>
-          <a:prstGeom prst="rect">
-            <a:avLst/>
-          </a:prstGeom>
-          <a:noFill/>
-        </p:spPr>
-        <p:txBody>
-          <a:bodyPr wrap="none" rtlCol="0">
-            <a:spAutoFit/>
-          </a:bodyPr>
-          <a:lstStyle/>
-          <a:p>
-            <a:r>
-              <a:rPr lang="en-SG" sz="1200" dirty="0"/>
-              <a:t>Request IPs of Text.txt chunks</a:t>
-            </a:r>
-          </a:p>
-        </p:txBody>
-      </p:sp>
-      <p:sp>
-        <p:nvSpPr>
-          <p:cNvPr id="47" name="TextBox 46">
-            <a:extLst>
-              <a:ext uri="{FF2B5EF4-FFF2-40B4-BE49-F238E27FC236}">
-                <a16:creationId xmlns:a16="http://schemas.microsoft.com/office/drawing/2014/main" id="{4CF8987F-F75E-42CD-902E-C31477D857C2}"/>
-              </a:ext>
-            </a:extLst>
-          </p:cNvPr>
-          <p:cNvSpPr txBox="1"/>
-          <p:nvPr/>
-        </p:nvSpPr>
-        <p:spPr>
-          <a:xfrm rot="457508">
-            <a:off x="5789821" y="4404414"/>
+            <a:off x="5860314" y="4207533"/>
             <a:ext cx="1341649" cy="276999"/>
           </a:xfrm>
           <a:prstGeom prst="rect">
@@ -5699,7 +5622,7 @@
           <p:cNvPr id="35" name="Straight Arrow Connector 34">
             <a:extLst>
               <a:ext uri="{FF2B5EF4-FFF2-40B4-BE49-F238E27FC236}">
-                <a16:creationId xmlns:a16="http://schemas.microsoft.com/office/drawing/2014/main" id="{E228CC9A-E6B0-464E-8739-875D498378AE}"/>
+                <a16:creationId xmlns:a16="http://schemas.microsoft.com/office/drawing/2014/main" xmlns="" id="{E228CC9A-E6B0-464E-8739-875D498378AE}"/>
               </a:ext>
             </a:extLst>
           </p:cNvPr>
@@ -5710,7 +5633,7 @@
         </p:nvCxnSpPr>
         <p:spPr>
           <a:xfrm flipH="1">
-            <a:off x="3488536" y="5124863"/>
+            <a:off x="3492098" y="4431646"/>
             <a:ext cx="1942268" cy="200234"/>
           </a:xfrm>
           <a:prstGeom prst="straightConnector1">
@@ -5741,7 +5664,7 @@
           <p:cNvPr id="39" name="Straight Arrow Connector 38">
             <a:extLst>
               <a:ext uri="{FF2B5EF4-FFF2-40B4-BE49-F238E27FC236}">
-                <a16:creationId xmlns:a16="http://schemas.microsoft.com/office/drawing/2014/main" id="{B5BA97C3-9B41-44B9-8434-95A0A299B892}"/>
+                <a16:creationId xmlns:a16="http://schemas.microsoft.com/office/drawing/2014/main" xmlns="" id="{B5BA97C3-9B41-44B9-8434-95A0A299B892}"/>
               </a:ext>
             </a:extLst>
           </p:cNvPr>
@@ -5752,7 +5675,7 @@
         </p:nvCxnSpPr>
         <p:spPr>
           <a:xfrm>
-            <a:off x="3475184" y="5410753"/>
+            <a:off x="3478746" y="4717536"/>
             <a:ext cx="1948945" cy="209131"/>
           </a:xfrm>
           <a:prstGeom prst="straightConnector1">
@@ -5783,7 +5706,7 @@
           <p:cNvPr id="40" name="Straight Arrow Connector 39">
             <a:extLst>
               <a:ext uri="{FF2B5EF4-FFF2-40B4-BE49-F238E27FC236}">
-                <a16:creationId xmlns:a16="http://schemas.microsoft.com/office/drawing/2014/main" id="{ACC1385D-B2D8-4257-B7AC-B1F66E763D9F}"/>
+                <a16:creationId xmlns:a16="http://schemas.microsoft.com/office/drawing/2014/main" xmlns="" id="{ACC1385D-B2D8-4257-B7AC-B1F66E763D9F}"/>
               </a:ext>
             </a:extLst>
           </p:cNvPr>
@@ -5794,7 +5717,7 @@
         </p:nvCxnSpPr>
         <p:spPr>
           <a:xfrm>
-            <a:off x="3488536" y="5779266"/>
+            <a:off x="3492098" y="5086049"/>
             <a:ext cx="1948945" cy="209131"/>
           </a:xfrm>
           <a:prstGeom prst="straightConnector1">
@@ -5825,7 +5748,7 @@
           <p:cNvPr id="49" name="TextBox 48">
             <a:extLst>
               <a:ext uri="{FF2B5EF4-FFF2-40B4-BE49-F238E27FC236}">
-                <a16:creationId xmlns:a16="http://schemas.microsoft.com/office/drawing/2014/main" id="{8890EC4E-140C-4956-BFCA-31A778345114}"/>
+                <a16:creationId xmlns:a16="http://schemas.microsoft.com/office/drawing/2014/main" xmlns="" id="{8890EC4E-140C-4956-BFCA-31A778345114}"/>
               </a:ext>
             </a:extLst>
           </p:cNvPr>
@@ -5834,7 +5757,7 @@
         </p:nvSpPr>
         <p:spPr>
           <a:xfrm rot="21272344">
-            <a:off x="3623144" y="4964192"/>
+            <a:off x="3626706" y="4270975"/>
             <a:ext cx="1732782" cy="276999"/>
           </a:xfrm>
           <a:prstGeom prst="rect">
@@ -5860,7 +5783,7 @@
           <p:cNvPr id="50" name="TextBox 49">
             <a:extLst>
               <a:ext uri="{FF2B5EF4-FFF2-40B4-BE49-F238E27FC236}">
-                <a16:creationId xmlns:a16="http://schemas.microsoft.com/office/drawing/2014/main" id="{C997EF73-28C2-4EBB-A7A2-FF791E7C2BCA}"/>
+                <a16:creationId xmlns:a16="http://schemas.microsoft.com/office/drawing/2014/main" xmlns="" id="{C997EF73-28C2-4EBB-A7A2-FF791E7C2BCA}"/>
               </a:ext>
             </a:extLst>
           </p:cNvPr>
@@ -5869,7 +5792,7 @@
         </p:nvSpPr>
         <p:spPr>
           <a:xfrm rot="457508">
-            <a:off x="3450194" y="5570624"/>
+            <a:off x="3453756" y="4877407"/>
             <a:ext cx="2018951" cy="276999"/>
           </a:xfrm>
           <a:prstGeom prst="rect">
@@ -5890,32 +5813,26 @@
           </a:p>
         </p:txBody>
       </p:sp>
-      <p:cxnSp>
-        <p:nvCxnSpPr>
-          <p:cNvPr id="60" name="Straight Arrow Connector 59">
-            <a:extLst>
-              <a:ext uri="{FF2B5EF4-FFF2-40B4-BE49-F238E27FC236}">
-                <a16:creationId xmlns:a16="http://schemas.microsoft.com/office/drawing/2014/main" id="{529F9EF8-190E-4370-9474-9128EA81707D}"/>
-              </a:ext>
-            </a:extLst>
-          </p:cNvPr>
-          <p:cNvCxnSpPr>
-            <a:cxnSpLocks/>
-          </p:cNvCxnSpPr>
-          <p:nvPr/>
-        </p:nvCxnSpPr>
-        <p:spPr>
-          <a:xfrm flipH="1">
-            <a:off x="5480263" y="4855835"/>
-            <a:ext cx="1942268" cy="200234"/>
-          </a:xfrm>
-          <a:prstGeom prst="straightConnector1">
-            <a:avLst/>
-          </a:prstGeom>
-          <a:ln w="19050">
-            <a:prstDash val="dash"/>
-            <a:tailEnd type="triangle"/>
-          </a:ln>
+      <p:sp>
+        <p:nvSpPr>
+          <p:cNvPr id="9" name="Left Brace 8">
+            <a:extLst>
+              <a:ext uri="{FF2B5EF4-FFF2-40B4-BE49-F238E27FC236}">
+                <a16:creationId xmlns:a16="http://schemas.microsoft.com/office/drawing/2014/main" xmlns="" id="{5262A3BB-18A9-4C3C-BE5D-2C659B897ABD}"/>
+              </a:ext>
+            </a:extLst>
+          </p:cNvPr>
+          <p:cNvSpPr/>
+          <p:nvPr/>
+        </p:nvSpPr>
+        <p:spPr>
+          <a:xfrm>
+            <a:off x="3209267" y="4305948"/>
+            <a:ext cx="132082" cy="1368263"/>
+          </a:xfrm>
+          <a:prstGeom prst="leftBrace">
+            <a:avLst/>
+          </a:prstGeom>
         </p:spPr>
         <p:style>
           <a:lnRef idx="1">
@@ -5931,13 +5848,21 @@
             <a:schemeClr val="tx1"/>
           </a:fontRef>
         </p:style>
-      </p:cxnSp>
-      <p:sp>
-        <p:nvSpPr>
-          <p:cNvPr id="61" name="TextBox 60">
-            <a:extLst>
-              <a:ext uri="{FF2B5EF4-FFF2-40B4-BE49-F238E27FC236}">
-                <a16:creationId xmlns:a16="http://schemas.microsoft.com/office/drawing/2014/main" id="{1E7DD8E3-BE70-4A94-9CF2-555CCC64F29C}"/>
+        <p:txBody>
+          <a:bodyPr rtlCol="0" anchor="ctr"/>
+          <a:lstStyle/>
+          <a:p>
+            <a:pPr algn="ctr"/>
+            <a:endParaRPr lang="en-SG"/>
+          </a:p>
+        </p:txBody>
+      </p:sp>
+      <p:sp>
+        <p:nvSpPr>
+          <p:cNvPr id="62" name="TextBox 61">
+            <a:extLst>
+              <a:ext uri="{FF2B5EF4-FFF2-40B4-BE49-F238E27FC236}">
+                <a16:creationId xmlns:a16="http://schemas.microsoft.com/office/drawing/2014/main" xmlns="" id="{73DD974A-A487-46D3-B90A-6693166B0930}"/>
               </a:ext>
             </a:extLst>
           </p:cNvPr>
@@ -5945,9 +5870,9 @@
           <p:nvPr/>
         </p:nvSpPr>
         <p:spPr>
-          <a:xfrm rot="21272344">
-            <a:off x="5453928" y="4696059"/>
-            <a:ext cx="2084801" cy="276999"/>
+          <a:xfrm>
+            <a:off x="2219250" y="4851579"/>
+            <a:ext cx="1056058" cy="276999"/>
           </a:xfrm>
           <a:prstGeom prst="rect">
             <a:avLst/>
@@ -5962,85 +5887,6 @@
           <a:p>
             <a:r>
               <a:rPr lang="en-SG" sz="1200" dirty="0"/>
-              <a:t>Reply list of IP and chunks no.</a:t>
-            </a:r>
-          </a:p>
-        </p:txBody>
-      </p:sp>
-      <p:sp>
-        <p:nvSpPr>
-          <p:cNvPr id="9" name="Left Brace 8">
-            <a:extLst>
-              <a:ext uri="{FF2B5EF4-FFF2-40B4-BE49-F238E27FC236}">
-                <a16:creationId xmlns:a16="http://schemas.microsoft.com/office/drawing/2014/main" id="{5262A3BB-18A9-4C3C-BE5D-2C659B897ABD}"/>
-              </a:ext>
-            </a:extLst>
-          </p:cNvPr>
-          <p:cNvSpPr/>
-          <p:nvPr/>
-        </p:nvSpPr>
-        <p:spPr>
-          <a:xfrm>
-            <a:off x="3205705" y="4999165"/>
-            <a:ext cx="132082" cy="1368263"/>
-          </a:xfrm>
-          <a:prstGeom prst="leftBrace">
-            <a:avLst/>
-          </a:prstGeom>
-        </p:spPr>
-        <p:style>
-          <a:lnRef idx="1">
-            <a:schemeClr val="accent1"/>
-          </a:lnRef>
-          <a:fillRef idx="0">
-            <a:schemeClr val="accent1"/>
-          </a:fillRef>
-          <a:effectRef idx="0">
-            <a:schemeClr val="accent1"/>
-          </a:effectRef>
-          <a:fontRef idx="minor">
-            <a:schemeClr val="tx1"/>
-          </a:fontRef>
-        </p:style>
-        <p:txBody>
-          <a:bodyPr rtlCol="0" anchor="ctr"/>
-          <a:lstStyle/>
-          <a:p>
-            <a:pPr algn="ctr"/>
-            <a:endParaRPr lang="en-SG"/>
-          </a:p>
-        </p:txBody>
-      </p:sp>
-      <p:sp>
-        <p:nvSpPr>
-          <p:cNvPr id="62" name="TextBox 61">
-            <a:extLst>
-              <a:ext uri="{FF2B5EF4-FFF2-40B4-BE49-F238E27FC236}">
-                <a16:creationId xmlns:a16="http://schemas.microsoft.com/office/drawing/2014/main" id="{73DD974A-A487-46D3-B90A-6693166B0930}"/>
-              </a:ext>
-            </a:extLst>
-          </p:cNvPr>
-          <p:cNvSpPr txBox="1"/>
-          <p:nvPr/>
-        </p:nvSpPr>
-        <p:spPr>
-          <a:xfrm>
-            <a:off x="2215688" y="5544796"/>
-            <a:ext cx="1056058" cy="276999"/>
-          </a:xfrm>
-          <a:prstGeom prst="rect">
-            <a:avLst/>
-          </a:prstGeom>
-          <a:noFill/>
-        </p:spPr>
-        <p:txBody>
-          <a:bodyPr wrap="none" rtlCol="0">
-            <a:spAutoFit/>
-          </a:bodyPr>
-          <a:lstStyle/>
-          <a:p>
-            <a:r>
-              <a:rPr lang="en-SG" sz="1200" dirty="0"/>
               <a:t>Different Peer</a:t>
             </a:r>
           </a:p>
@@ -6051,7 +5897,7 @@
           <p:cNvPr id="12" name="Connector: Curved 11">
             <a:extLst>
               <a:ext uri="{FF2B5EF4-FFF2-40B4-BE49-F238E27FC236}">
-                <a16:creationId xmlns:a16="http://schemas.microsoft.com/office/drawing/2014/main" id="{84FE2D5F-D982-4A00-947A-59B5A3D6FB75}"/>
+                <a16:creationId xmlns:a16="http://schemas.microsoft.com/office/drawing/2014/main" xmlns="" id="{84FE2D5F-D982-4A00-947A-59B5A3D6FB75}"/>
               </a:ext>
             </a:extLst>
           </p:cNvPr>
@@ -6063,8 +5909,8 @@
         </p:nvCxnSpPr>
         <p:spPr>
           <a:xfrm rot="10800000">
-            <a:off x="4461279" y="4119745"/>
-            <a:ext cx="1334474" cy="334157"/>
+            <a:off x="4461280" y="4119744"/>
+            <a:ext cx="1404967" cy="137276"/>
           </a:xfrm>
           <a:prstGeom prst="curvedConnector2">
             <a:avLst/>
@@ -6126,7 +5972,7 @@
           <p:cNvPr id="4" name="Rectangle 3">
             <a:extLst>
               <a:ext uri="{FF2B5EF4-FFF2-40B4-BE49-F238E27FC236}">
-                <a16:creationId xmlns:a16="http://schemas.microsoft.com/office/drawing/2014/main" id="{3C95D3E1-8D09-427D-8491-A3C394D0E969}"/>
+                <a16:creationId xmlns:a16="http://schemas.microsoft.com/office/drawing/2014/main" xmlns="" id="{3C95D3E1-8D09-427D-8491-A3C394D0E969}"/>
               </a:ext>
             </a:extLst>
           </p:cNvPr>
@@ -6180,7 +6026,7 @@
           <p:cNvPr id="5" name="Rectangle 4">
             <a:extLst>
               <a:ext uri="{FF2B5EF4-FFF2-40B4-BE49-F238E27FC236}">
-                <a16:creationId xmlns:a16="http://schemas.microsoft.com/office/drawing/2014/main" id="{2B2438E7-6F1E-45C0-8A1D-25D2C821E83E}"/>
+                <a16:creationId xmlns:a16="http://schemas.microsoft.com/office/drawing/2014/main" xmlns="" id="{2B2438E7-6F1E-45C0-8A1D-25D2C821E83E}"/>
               </a:ext>
             </a:extLst>
           </p:cNvPr>
@@ -6335,7 +6181,7 @@
           <p:cNvPr id="8" name="Rectangle 7">
             <a:extLst>
               <a:ext uri="{FF2B5EF4-FFF2-40B4-BE49-F238E27FC236}">
-                <a16:creationId xmlns:a16="http://schemas.microsoft.com/office/drawing/2014/main" id="{1896AD9B-CBB7-4332-81BC-30E116C8B452}"/>
+                <a16:creationId xmlns:a16="http://schemas.microsoft.com/office/drawing/2014/main" xmlns="" id="{1896AD9B-CBB7-4332-81BC-30E116C8B452}"/>
               </a:ext>
             </a:extLst>
           </p:cNvPr>
@@ -6389,7 +6235,7 @@
           <p:cNvPr id="9" name="Rectangle 8">
             <a:extLst>
               <a:ext uri="{FF2B5EF4-FFF2-40B4-BE49-F238E27FC236}">
-                <a16:creationId xmlns:a16="http://schemas.microsoft.com/office/drawing/2014/main" id="{1B8761C0-D1A1-4560-A8B0-F6D4F5762AD3}"/>
+                <a16:creationId xmlns:a16="http://schemas.microsoft.com/office/drawing/2014/main" xmlns="" id="{1B8761C0-D1A1-4560-A8B0-F6D4F5762AD3}"/>
               </a:ext>
             </a:extLst>
           </p:cNvPr>
@@ -6496,7 +6342,7 @@
           <p:cNvPr id="14" name="Rectangle 13">
             <a:extLst>
               <a:ext uri="{FF2B5EF4-FFF2-40B4-BE49-F238E27FC236}">
-                <a16:creationId xmlns:a16="http://schemas.microsoft.com/office/drawing/2014/main" id="{07D1FCA3-D8E8-4277-9E7F-44CBD719D0CA}"/>
+                <a16:creationId xmlns:a16="http://schemas.microsoft.com/office/drawing/2014/main" xmlns="" id="{07D1FCA3-D8E8-4277-9E7F-44CBD719D0CA}"/>
               </a:ext>
             </a:extLst>
           </p:cNvPr>
@@ -6550,7 +6396,7 @@
           <p:cNvPr id="16" name="Rectangle 15">
             <a:extLst>
               <a:ext uri="{FF2B5EF4-FFF2-40B4-BE49-F238E27FC236}">
-                <a16:creationId xmlns:a16="http://schemas.microsoft.com/office/drawing/2014/main" id="{448D38F9-EBD7-4833-94E5-93C869E14A80}"/>
+                <a16:creationId xmlns:a16="http://schemas.microsoft.com/office/drawing/2014/main" xmlns="" id="{448D38F9-EBD7-4833-94E5-93C869E14A80}"/>
               </a:ext>
             </a:extLst>
           </p:cNvPr>
@@ -6604,7 +6450,7 @@
           <p:cNvPr id="20" name="Rectangle 19">
             <a:extLst>
               <a:ext uri="{FF2B5EF4-FFF2-40B4-BE49-F238E27FC236}">
-                <a16:creationId xmlns:a16="http://schemas.microsoft.com/office/drawing/2014/main" id="{80435569-7C2E-4A25-AB78-3D93D65E2700}"/>
+                <a16:creationId xmlns:a16="http://schemas.microsoft.com/office/drawing/2014/main" xmlns="" id="{80435569-7C2E-4A25-AB78-3D93D65E2700}"/>
               </a:ext>
             </a:extLst>
           </p:cNvPr>
@@ -6658,7 +6504,7 @@
           <p:cNvPr id="21" name="Rectangle 20">
             <a:extLst>
               <a:ext uri="{FF2B5EF4-FFF2-40B4-BE49-F238E27FC236}">
-                <a16:creationId xmlns:a16="http://schemas.microsoft.com/office/drawing/2014/main" id="{A8670990-DA95-4E48-93EB-86D615A37B9B}"/>
+                <a16:creationId xmlns:a16="http://schemas.microsoft.com/office/drawing/2014/main" xmlns="" id="{A8670990-DA95-4E48-93EB-86D615A37B9B}"/>
               </a:ext>
             </a:extLst>
           </p:cNvPr>
@@ -6723,7 +6569,7 @@
           <p:cNvPr id="26" name="Rectangle 25">
             <a:extLst>
               <a:ext uri="{FF2B5EF4-FFF2-40B4-BE49-F238E27FC236}">
-                <a16:creationId xmlns:a16="http://schemas.microsoft.com/office/drawing/2014/main" id="{00A31B67-AE8C-4CAC-A420-22540EB4455B}"/>
+                <a16:creationId xmlns:a16="http://schemas.microsoft.com/office/drawing/2014/main" xmlns="" id="{00A31B67-AE8C-4CAC-A420-22540EB4455B}"/>
               </a:ext>
             </a:extLst>
           </p:cNvPr>
@@ -6788,7 +6634,7 @@
           <p:cNvPr id="30" name="Rectangle 29">
             <a:extLst>
               <a:ext uri="{FF2B5EF4-FFF2-40B4-BE49-F238E27FC236}">
-                <a16:creationId xmlns:a16="http://schemas.microsoft.com/office/drawing/2014/main" id="{D3ADD298-536B-44E0-9313-53FDC025C721}"/>
+                <a16:creationId xmlns:a16="http://schemas.microsoft.com/office/drawing/2014/main" xmlns="" id="{D3ADD298-536B-44E0-9313-53FDC025C721}"/>
               </a:ext>
             </a:extLst>
           </p:cNvPr>
@@ -6853,7 +6699,7 @@
           <p:cNvPr id="31" name="Rectangle 30">
             <a:extLst>
               <a:ext uri="{FF2B5EF4-FFF2-40B4-BE49-F238E27FC236}">
-                <a16:creationId xmlns:a16="http://schemas.microsoft.com/office/drawing/2014/main" id="{48FCC982-899F-45CA-BA11-A492716DDDE7}"/>
+                <a16:creationId xmlns:a16="http://schemas.microsoft.com/office/drawing/2014/main" xmlns="" id="{48FCC982-899F-45CA-BA11-A492716DDDE7}"/>
               </a:ext>
             </a:extLst>
           </p:cNvPr>
@@ -6907,7 +6753,7 @@
           <p:cNvPr id="32" name="Rectangle 31">
             <a:extLst>
               <a:ext uri="{FF2B5EF4-FFF2-40B4-BE49-F238E27FC236}">
-                <a16:creationId xmlns:a16="http://schemas.microsoft.com/office/drawing/2014/main" id="{1AF611BF-F298-4F12-BE12-9F0C905B1E8F}"/>
+                <a16:creationId xmlns:a16="http://schemas.microsoft.com/office/drawing/2014/main" xmlns="" id="{1AF611BF-F298-4F12-BE12-9F0C905B1E8F}"/>
               </a:ext>
             </a:extLst>
           </p:cNvPr>
@@ -6961,7 +6807,7 @@
           <p:cNvPr id="35" name="Straight Connector 34">
             <a:extLst>
               <a:ext uri="{FF2B5EF4-FFF2-40B4-BE49-F238E27FC236}">
-                <a16:creationId xmlns:a16="http://schemas.microsoft.com/office/drawing/2014/main" id="{A47F04F1-9257-419F-B41D-1AE808E3BABA}"/>
+                <a16:creationId xmlns:a16="http://schemas.microsoft.com/office/drawing/2014/main" xmlns="" id="{A47F04F1-9257-419F-B41D-1AE808E3BABA}"/>
               </a:ext>
             </a:extLst>
           </p:cNvPr>
@@ -7000,7 +6846,7 @@
           <p:cNvPr id="36" name="Straight Connector 35">
             <a:extLst>
               <a:ext uri="{FF2B5EF4-FFF2-40B4-BE49-F238E27FC236}">
-                <a16:creationId xmlns:a16="http://schemas.microsoft.com/office/drawing/2014/main" id="{92FA6C15-3844-43F9-81DB-EB9CCA97CAFB}"/>
+                <a16:creationId xmlns:a16="http://schemas.microsoft.com/office/drawing/2014/main" xmlns="" id="{92FA6C15-3844-43F9-81DB-EB9CCA97CAFB}"/>
               </a:ext>
             </a:extLst>
           </p:cNvPr>
@@ -7041,7 +6887,7 @@
           <p:cNvPr id="39" name="Straight Connector 38">
             <a:extLst>
               <a:ext uri="{FF2B5EF4-FFF2-40B4-BE49-F238E27FC236}">
-                <a16:creationId xmlns:a16="http://schemas.microsoft.com/office/drawing/2014/main" id="{930CB414-34AA-4575-80E8-E537C80D542E}"/>
+                <a16:creationId xmlns:a16="http://schemas.microsoft.com/office/drawing/2014/main" xmlns="" id="{930CB414-34AA-4575-80E8-E537C80D542E}"/>
               </a:ext>
             </a:extLst>
           </p:cNvPr>
@@ -7082,7 +6928,7 @@
           <p:cNvPr id="43" name="Rectangle 42">
             <a:extLst>
               <a:ext uri="{FF2B5EF4-FFF2-40B4-BE49-F238E27FC236}">
-                <a16:creationId xmlns:a16="http://schemas.microsoft.com/office/drawing/2014/main" id="{09FEA4AD-8519-41FF-8809-151E02548AC8}"/>
+                <a16:creationId xmlns:a16="http://schemas.microsoft.com/office/drawing/2014/main" xmlns="" id="{09FEA4AD-8519-41FF-8809-151E02548AC8}"/>
               </a:ext>
             </a:extLst>
           </p:cNvPr>
@@ -7136,7 +6982,7 @@
           <p:cNvPr id="44" name="Rectangle 43">
             <a:extLst>
               <a:ext uri="{FF2B5EF4-FFF2-40B4-BE49-F238E27FC236}">
-                <a16:creationId xmlns:a16="http://schemas.microsoft.com/office/drawing/2014/main" id="{2409478E-CBCA-4613-A7A3-D1F42BFB248B}"/>
+                <a16:creationId xmlns:a16="http://schemas.microsoft.com/office/drawing/2014/main" xmlns="" id="{2409478E-CBCA-4613-A7A3-D1F42BFB248B}"/>
               </a:ext>
             </a:extLst>
           </p:cNvPr>
@@ -7201,7 +7047,7 @@
           <p:cNvPr id="45" name="Rectangle 44">
             <a:extLst>
               <a:ext uri="{FF2B5EF4-FFF2-40B4-BE49-F238E27FC236}">
-                <a16:creationId xmlns:a16="http://schemas.microsoft.com/office/drawing/2014/main" id="{B68CA313-0D8C-41D0-A99E-D9679A580290}"/>
+                <a16:creationId xmlns:a16="http://schemas.microsoft.com/office/drawing/2014/main" xmlns="" id="{B68CA313-0D8C-41D0-A99E-D9679A580290}"/>
               </a:ext>
             </a:extLst>
           </p:cNvPr>
@@ -7266,7 +7112,7 @@
           <p:cNvPr id="46" name="Rectangle 45">
             <a:extLst>
               <a:ext uri="{FF2B5EF4-FFF2-40B4-BE49-F238E27FC236}">
-                <a16:creationId xmlns:a16="http://schemas.microsoft.com/office/drawing/2014/main" id="{05073A20-3BBF-489E-B9FE-974ACF06FF82}"/>
+                <a16:creationId xmlns:a16="http://schemas.microsoft.com/office/drawing/2014/main" xmlns="" id="{05073A20-3BBF-489E-B9FE-974ACF06FF82}"/>
               </a:ext>
             </a:extLst>
           </p:cNvPr>
@@ -7336,7 +7182,7 @@
           <p:cNvPr id="47" name="Rectangle 46">
             <a:extLst>
               <a:ext uri="{FF2B5EF4-FFF2-40B4-BE49-F238E27FC236}">
-                <a16:creationId xmlns:a16="http://schemas.microsoft.com/office/drawing/2014/main" id="{4B505762-B127-4337-A6CE-B6DEC70D0802}"/>
+                <a16:creationId xmlns:a16="http://schemas.microsoft.com/office/drawing/2014/main" xmlns="" id="{4B505762-B127-4337-A6CE-B6DEC70D0802}"/>
               </a:ext>
             </a:extLst>
           </p:cNvPr>
@@ -7390,7 +7236,7 @@
           <p:cNvPr id="48" name="Rectangle 47">
             <a:extLst>
               <a:ext uri="{FF2B5EF4-FFF2-40B4-BE49-F238E27FC236}">
-                <a16:creationId xmlns:a16="http://schemas.microsoft.com/office/drawing/2014/main" id="{148B3383-7C3E-4E70-A69D-39147F39BBA4}"/>
+                <a16:creationId xmlns:a16="http://schemas.microsoft.com/office/drawing/2014/main" xmlns="" id="{148B3383-7C3E-4E70-A69D-39147F39BBA4}"/>
               </a:ext>
             </a:extLst>
           </p:cNvPr>
@@ -7444,7 +7290,7 @@
           <p:cNvPr id="50" name="Straight Connector 49">
             <a:extLst>
               <a:ext uri="{FF2B5EF4-FFF2-40B4-BE49-F238E27FC236}">
-                <a16:creationId xmlns:a16="http://schemas.microsoft.com/office/drawing/2014/main" id="{8E05A5B8-FCA8-4366-A62C-F58F514413AF}"/>
+                <a16:creationId xmlns:a16="http://schemas.microsoft.com/office/drawing/2014/main" xmlns="" id="{8E05A5B8-FCA8-4366-A62C-F58F514413AF}"/>
               </a:ext>
             </a:extLst>
           </p:cNvPr>
@@ -7484,7 +7330,7 @@
           <p:cNvPr id="51" name="Straight Connector 50">
             <a:extLst>
               <a:ext uri="{FF2B5EF4-FFF2-40B4-BE49-F238E27FC236}">
-                <a16:creationId xmlns:a16="http://schemas.microsoft.com/office/drawing/2014/main" id="{5CFADD69-6619-4485-9A42-1AA88690B3FB}"/>
+                <a16:creationId xmlns:a16="http://schemas.microsoft.com/office/drawing/2014/main" xmlns="" id="{5CFADD69-6619-4485-9A42-1AA88690B3FB}"/>
               </a:ext>
             </a:extLst>
           </p:cNvPr>
@@ -7525,7 +7371,7 @@
           <p:cNvPr id="52" name="Straight Connector 51">
             <a:extLst>
               <a:ext uri="{FF2B5EF4-FFF2-40B4-BE49-F238E27FC236}">
-                <a16:creationId xmlns:a16="http://schemas.microsoft.com/office/drawing/2014/main" id="{6E1DD157-5A3D-4C5D-BB27-AB24F0933048}"/>
+                <a16:creationId xmlns:a16="http://schemas.microsoft.com/office/drawing/2014/main" xmlns="" id="{6E1DD157-5A3D-4C5D-BB27-AB24F0933048}"/>
               </a:ext>
             </a:extLst>
           </p:cNvPr>
@@ -7566,7 +7412,7 @@
           <p:cNvPr id="62" name="Connector: Elbow 61">
             <a:extLst>
               <a:ext uri="{FF2B5EF4-FFF2-40B4-BE49-F238E27FC236}">
-                <a16:creationId xmlns:a16="http://schemas.microsoft.com/office/drawing/2014/main" id="{9297BFA9-1E21-4B68-B917-AA2F88A3B627}"/>
+                <a16:creationId xmlns:a16="http://schemas.microsoft.com/office/drawing/2014/main" xmlns="" id="{9297BFA9-1E21-4B68-B917-AA2F88A3B627}"/>
               </a:ext>
             </a:extLst>
           </p:cNvPr>
@@ -7609,7 +7455,7 @@
           <p:cNvPr id="71" name="TextBox 70">
             <a:extLst>
               <a:ext uri="{FF2B5EF4-FFF2-40B4-BE49-F238E27FC236}">
-                <a16:creationId xmlns:a16="http://schemas.microsoft.com/office/drawing/2014/main" id="{1DC86762-A3B3-4B12-BC82-A9A8938DDA03}"/>
+                <a16:creationId xmlns:a16="http://schemas.microsoft.com/office/drawing/2014/main" xmlns="" id="{1DC86762-A3B3-4B12-BC82-A9A8938DDA03}"/>
               </a:ext>
             </a:extLst>
           </p:cNvPr>
@@ -7644,7 +7490,7 @@
           <p:cNvPr id="72" name="Connector: Elbow 71">
             <a:extLst>
               <a:ext uri="{FF2B5EF4-FFF2-40B4-BE49-F238E27FC236}">
-                <a16:creationId xmlns:a16="http://schemas.microsoft.com/office/drawing/2014/main" id="{E534A98A-7620-40AA-B618-9018F0ED08B3}"/>
+                <a16:creationId xmlns:a16="http://schemas.microsoft.com/office/drawing/2014/main" xmlns="" id="{E534A98A-7620-40AA-B618-9018F0ED08B3}"/>
               </a:ext>
             </a:extLst>
           </p:cNvPr>
@@ -7687,7 +7533,7 @@
           <p:cNvPr id="81" name="TextBox 80">
             <a:extLst>
               <a:ext uri="{FF2B5EF4-FFF2-40B4-BE49-F238E27FC236}">
-                <a16:creationId xmlns:a16="http://schemas.microsoft.com/office/drawing/2014/main" id="{7AE8D43F-11B7-47FD-BFFE-0F0FD934474F}"/>
+                <a16:creationId xmlns:a16="http://schemas.microsoft.com/office/drawing/2014/main" xmlns="" id="{7AE8D43F-11B7-47FD-BFFE-0F0FD934474F}"/>
               </a:ext>
             </a:extLst>
           </p:cNvPr>
@@ -7722,7 +7568,7 @@
           <p:cNvPr id="86" name="TextBox 85">
             <a:extLst>
               <a:ext uri="{FF2B5EF4-FFF2-40B4-BE49-F238E27FC236}">
-                <a16:creationId xmlns:a16="http://schemas.microsoft.com/office/drawing/2014/main" id="{C95ADF47-4D63-47C6-BCC9-FB3259C1DD61}"/>
+                <a16:creationId xmlns:a16="http://schemas.microsoft.com/office/drawing/2014/main" xmlns="" id="{C95ADF47-4D63-47C6-BCC9-FB3259C1DD61}"/>
               </a:ext>
             </a:extLst>
           </p:cNvPr>
@@ -7757,7 +7603,7 @@
           <p:cNvPr id="90" name="TextBox 89">
             <a:extLst>
               <a:ext uri="{FF2B5EF4-FFF2-40B4-BE49-F238E27FC236}">
-                <a16:creationId xmlns:a16="http://schemas.microsoft.com/office/drawing/2014/main" id="{20247B9A-7842-4FE9-805F-0C7212068BA7}"/>
+                <a16:creationId xmlns:a16="http://schemas.microsoft.com/office/drawing/2014/main" xmlns="" id="{20247B9A-7842-4FE9-805F-0C7212068BA7}"/>
               </a:ext>
             </a:extLst>
           </p:cNvPr>
@@ -7792,7 +7638,7 @@
           <p:cNvPr id="99" name="TextBox 98">
             <a:extLst>
               <a:ext uri="{FF2B5EF4-FFF2-40B4-BE49-F238E27FC236}">
-                <a16:creationId xmlns:a16="http://schemas.microsoft.com/office/drawing/2014/main" id="{33123D3C-5641-4EBD-BCBA-7F47E0D4E856}"/>
+                <a16:creationId xmlns:a16="http://schemas.microsoft.com/office/drawing/2014/main" xmlns="" id="{33123D3C-5641-4EBD-BCBA-7F47E0D4E856}"/>
               </a:ext>
             </a:extLst>
           </p:cNvPr>
@@ -7827,7 +7673,7 @@
           <p:cNvPr id="100" name="TextBox 99">
             <a:extLst>
               <a:ext uri="{FF2B5EF4-FFF2-40B4-BE49-F238E27FC236}">
-                <a16:creationId xmlns:a16="http://schemas.microsoft.com/office/drawing/2014/main" id="{D99B952C-E7C2-4B7D-B4AB-78FD40FA3F18}"/>
+                <a16:creationId xmlns:a16="http://schemas.microsoft.com/office/drawing/2014/main" xmlns="" id="{D99B952C-E7C2-4B7D-B4AB-78FD40FA3F18}"/>
               </a:ext>
             </a:extLst>
           </p:cNvPr>
@@ -7862,7 +7708,7 @@
           <p:cNvPr id="102" name="Straight Connector 101">
             <a:extLst>
               <a:ext uri="{FF2B5EF4-FFF2-40B4-BE49-F238E27FC236}">
-                <a16:creationId xmlns:a16="http://schemas.microsoft.com/office/drawing/2014/main" id="{78D852A9-91D5-4EDF-92E4-732C27E5147B}"/>
+                <a16:creationId xmlns:a16="http://schemas.microsoft.com/office/drawing/2014/main" xmlns="" id="{78D852A9-91D5-4EDF-92E4-732C27E5147B}"/>
               </a:ext>
             </a:extLst>
           </p:cNvPr>
@@ -7903,7 +7749,7 @@
           <p:cNvPr id="106" name="TextBox 105">
             <a:extLst>
               <a:ext uri="{FF2B5EF4-FFF2-40B4-BE49-F238E27FC236}">
-                <a16:creationId xmlns:a16="http://schemas.microsoft.com/office/drawing/2014/main" id="{A3275474-ABFE-42B2-BCEC-BDDCD106C661}"/>
+                <a16:creationId xmlns:a16="http://schemas.microsoft.com/office/drawing/2014/main" xmlns="" id="{A3275474-ABFE-42B2-BCEC-BDDCD106C661}"/>
               </a:ext>
             </a:extLst>
           </p:cNvPr>
@@ -7938,7 +7784,7 @@
           <p:cNvPr id="11" name="Straight Arrow Connector 10">
             <a:extLst>
               <a:ext uri="{FF2B5EF4-FFF2-40B4-BE49-F238E27FC236}">
-                <a16:creationId xmlns:a16="http://schemas.microsoft.com/office/drawing/2014/main" id="{3CE7D051-BA48-4A7A-874E-13C496923B39}"/>
+                <a16:creationId xmlns:a16="http://schemas.microsoft.com/office/drawing/2014/main" xmlns="" id="{3CE7D051-BA48-4A7A-874E-13C496923B39}"/>
               </a:ext>
             </a:extLst>
           </p:cNvPr>
@@ -7979,7 +7825,7 @@
           <p:cNvPr id="13" name="Straight Arrow Connector 12">
             <a:extLst>
               <a:ext uri="{FF2B5EF4-FFF2-40B4-BE49-F238E27FC236}">
-                <a16:creationId xmlns:a16="http://schemas.microsoft.com/office/drawing/2014/main" id="{3E0740FF-436A-4B91-B5E4-54F26430DD81}"/>
+                <a16:creationId xmlns:a16="http://schemas.microsoft.com/office/drawing/2014/main" xmlns="" id="{3E0740FF-436A-4B91-B5E4-54F26430DD81}"/>
               </a:ext>
             </a:extLst>
           </p:cNvPr>
@@ -8020,7 +7866,7 @@
           <p:cNvPr id="54" name="Straight Arrow Connector 53">
             <a:extLst>
               <a:ext uri="{FF2B5EF4-FFF2-40B4-BE49-F238E27FC236}">
-                <a16:creationId xmlns:a16="http://schemas.microsoft.com/office/drawing/2014/main" id="{7F3DBEA3-DA97-44D4-A1B8-6ABCF09C7D64}"/>
+                <a16:creationId xmlns:a16="http://schemas.microsoft.com/office/drawing/2014/main" xmlns="" id="{7F3DBEA3-DA97-44D4-A1B8-6ABCF09C7D64}"/>
               </a:ext>
             </a:extLst>
           </p:cNvPr>
@@ -8061,7 +7907,7 @@
           <p:cNvPr id="55" name="Straight Arrow Connector 54">
             <a:extLst>
               <a:ext uri="{FF2B5EF4-FFF2-40B4-BE49-F238E27FC236}">
-                <a16:creationId xmlns:a16="http://schemas.microsoft.com/office/drawing/2014/main" id="{9200BDA0-CFC3-4116-9A97-217B6F513E3C}"/>
+                <a16:creationId xmlns:a16="http://schemas.microsoft.com/office/drawing/2014/main" xmlns="" id="{9200BDA0-CFC3-4116-9A97-217B6F513E3C}"/>
               </a:ext>
             </a:extLst>
           </p:cNvPr>
@@ -8102,7 +7948,7 @@
           <p:cNvPr id="59" name="Connector: Elbow 58">
             <a:extLst>
               <a:ext uri="{FF2B5EF4-FFF2-40B4-BE49-F238E27FC236}">
-                <a16:creationId xmlns:a16="http://schemas.microsoft.com/office/drawing/2014/main" id="{CA453BC7-C0C6-499B-B80D-BD4E1E83BC1E}"/>
+                <a16:creationId xmlns:a16="http://schemas.microsoft.com/office/drawing/2014/main" xmlns="" id="{CA453BC7-C0C6-499B-B80D-BD4E1E83BC1E}"/>
               </a:ext>
             </a:extLst>
           </p:cNvPr>
@@ -8146,7 +7992,7 @@
           <p:cNvPr id="68" name="Connector: Elbow 67">
             <a:extLst>
               <a:ext uri="{FF2B5EF4-FFF2-40B4-BE49-F238E27FC236}">
-                <a16:creationId xmlns:a16="http://schemas.microsoft.com/office/drawing/2014/main" id="{B35A97CB-53CC-4037-8DF3-CFC3EBBB363A}"/>
+                <a16:creationId xmlns:a16="http://schemas.microsoft.com/office/drawing/2014/main" xmlns="" id="{B35A97CB-53CC-4037-8DF3-CFC3EBBB363A}"/>
               </a:ext>
             </a:extLst>
           </p:cNvPr>
@@ -8241,7 +8087,7 @@
     </a:clrScheme>
     <a:fontScheme name="Office">
       <a:majorFont>
-        <a:latin typeface="Calibri Light" panose="020F0302020204030204"/>
+        <a:latin typeface="Calibri Light"/>
         <a:ea typeface=""/>
         <a:cs typeface=""/>
         <a:font script="Jpan" typeface="游ゴシック Light"/>
@@ -8293,7 +8139,7 @@
         <a:font script="Tfng" typeface="Ebrima"/>
       </a:majorFont>
       <a:minorFont>
-        <a:latin typeface="Calibri" panose="020F0502020204030204"/>
+        <a:latin typeface="Calibri"/>
         <a:ea typeface=""/>
         <a:cs typeface=""/>
         <a:font script="Jpan" typeface="游ゴシック"/>
@@ -8487,7 +8333,7 @@
   <a:extraClrSchemeLst/>
   <a:extLst>
     <a:ext uri="{05A4C25C-085E-4340-85A3-A5531E510DB2}">
-      <thm15:themeFamily xmlns:thm15="http://schemas.microsoft.com/office/thememl/2012/main" name="Office Theme" id="{62F939B6-93AF-4DB8-9C6B-D6C7DFDC589F}" vid="{4A3C46E8-61CC-4603-A589-7422A47A8E4A}"/>
+      <thm15:themeFamily xmlns:thm15="http://schemas.microsoft.com/office/thememl/2012/main" xmlns="" name="Office Theme" id="{62F939B6-93AF-4DB8-9C6B-D6C7DFDC589F}" vid="{4A3C46E8-61CC-4603-A589-7422A47A8E4A}"/>
     </a:ext>
   </a:extLst>
 </a:theme>

</xml_diff>